<commit_message>
Updated Lecture 8 and demos of homeworks
</commit_message>
<xml_diff>
--- a/08-Methods-and-Recursion.pptx
+++ b/08-Methods-and-Recursion.pptx
@@ -5,7 +5,7 @@
     <p:sldMasterId id="2147483648" r:id="rId1"/>
   </p:sldMasterIdLst>
   <p:notesMasterIdLst>
-    <p:notesMasterId r:id="rId34"/>
+    <p:notesMasterId r:id="rId35"/>
   </p:notesMasterIdLst>
   <p:sldIdLst>
     <p:sldId id="256" r:id="rId2"/>
@@ -25,21 +25,22 @@
     <p:sldId id="333" r:id="rId16"/>
     <p:sldId id="401" r:id="rId17"/>
     <p:sldId id="402" r:id="rId18"/>
-    <p:sldId id="408" r:id="rId19"/>
-    <p:sldId id="407" r:id="rId20"/>
-    <p:sldId id="409" r:id="rId21"/>
-    <p:sldId id="410" r:id="rId22"/>
-    <p:sldId id="411" r:id="rId23"/>
-    <p:sldId id="412" r:id="rId24"/>
-    <p:sldId id="414" r:id="rId25"/>
-    <p:sldId id="403" r:id="rId26"/>
-    <p:sldId id="404" r:id="rId27"/>
-    <p:sldId id="416" r:id="rId28"/>
-    <p:sldId id="405" r:id="rId29"/>
-    <p:sldId id="268" r:id="rId30"/>
-    <p:sldId id="381" r:id="rId31"/>
-    <p:sldId id="400" r:id="rId32"/>
-    <p:sldId id="415" r:id="rId33"/>
+    <p:sldId id="409" r:id="rId19"/>
+    <p:sldId id="408" r:id="rId20"/>
+    <p:sldId id="407" r:id="rId21"/>
+    <p:sldId id="417" r:id="rId22"/>
+    <p:sldId id="410" r:id="rId23"/>
+    <p:sldId id="411" r:id="rId24"/>
+    <p:sldId id="412" r:id="rId25"/>
+    <p:sldId id="414" r:id="rId26"/>
+    <p:sldId id="403" r:id="rId27"/>
+    <p:sldId id="404" r:id="rId28"/>
+    <p:sldId id="416" r:id="rId29"/>
+    <p:sldId id="405" r:id="rId30"/>
+    <p:sldId id="268" r:id="rId31"/>
+    <p:sldId id="381" r:id="rId32"/>
+    <p:sldId id="400" r:id="rId33"/>
+    <p:sldId id="415" r:id="rId34"/>
   </p:sldIdLst>
   <p:sldSz cx="9144000" cy="6858000" type="screen4x3"/>
   <p:notesSz cx="6858000" cy="9144000"/>
@@ -239,7 +240,7 @@
           <a:p>
             <a:fld id="{1A052DDE-B79B-4585-97B6-DCDE6083B029}" type="datetimeFigureOut">
               <a:rPr lang="bg-BG" smtClean="0"/>
-              <a:t>20.5.2015 г.</a:t>
+              <a:t>22.5.2015 г.</a:t>
             </a:fld>
             <a:endParaRPr lang="bg-BG"/>
           </a:p>
@@ -572,7 +573,7 @@
           <a:p>
             <a:fld id="{9738FF17-0FCD-4628-80AB-FA4FB2F12033}" type="slidenum">
               <a:rPr lang="bg-BG" smtClean="0"/>
-              <a:t>32</a:t>
+              <a:t>33</a:t>
             </a:fld>
             <a:endParaRPr lang="bg-BG"/>
           </a:p>
@@ -772,7 +773,7 @@
           <a:p>
             <a:fld id="{3EA744D9-3FBE-48D8-BF2A-85DF203E4D20}" type="datetimeFigureOut">
               <a:rPr lang="bg-BG" smtClean="0"/>
-              <a:t>20.5.2015 г.</a:t>
+              <a:t>22.5.2015 г.</a:t>
             </a:fld>
             <a:endParaRPr lang="bg-BG"/>
           </a:p>
@@ -942,7 +943,7 @@
           <a:p>
             <a:fld id="{3EA744D9-3FBE-48D8-BF2A-85DF203E4D20}" type="datetimeFigureOut">
               <a:rPr lang="bg-BG" smtClean="0"/>
-              <a:t>20.5.2015 г.</a:t>
+              <a:t>22.5.2015 г.</a:t>
             </a:fld>
             <a:endParaRPr lang="bg-BG"/>
           </a:p>
@@ -1122,7 +1123,7 @@
           <a:p>
             <a:fld id="{3EA744D9-3FBE-48D8-BF2A-85DF203E4D20}" type="datetimeFigureOut">
               <a:rPr lang="bg-BG" smtClean="0"/>
-              <a:t>20.5.2015 г.</a:t>
+              <a:t>22.5.2015 г.</a:t>
             </a:fld>
             <a:endParaRPr lang="bg-BG"/>
           </a:p>
@@ -1292,7 +1293,7 @@
           <a:p>
             <a:fld id="{3EA744D9-3FBE-48D8-BF2A-85DF203E4D20}" type="datetimeFigureOut">
               <a:rPr lang="bg-BG" smtClean="0"/>
-              <a:t>20.5.2015 г.</a:t>
+              <a:t>22.5.2015 г.</a:t>
             </a:fld>
             <a:endParaRPr lang="bg-BG"/>
           </a:p>
@@ -1538,7 +1539,7 @@
           <a:p>
             <a:fld id="{3EA744D9-3FBE-48D8-BF2A-85DF203E4D20}" type="datetimeFigureOut">
               <a:rPr lang="bg-BG" smtClean="0"/>
-              <a:t>20.5.2015 г.</a:t>
+              <a:t>22.5.2015 г.</a:t>
             </a:fld>
             <a:endParaRPr lang="bg-BG"/>
           </a:p>
@@ -1826,7 +1827,7 @@
           <a:p>
             <a:fld id="{3EA744D9-3FBE-48D8-BF2A-85DF203E4D20}" type="datetimeFigureOut">
               <a:rPr lang="bg-BG" smtClean="0"/>
-              <a:t>20.5.2015 г.</a:t>
+              <a:t>22.5.2015 г.</a:t>
             </a:fld>
             <a:endParaRPr lang="bg-BG"/>
           </a:p>
@@ -2248,7 +2249,7 @@
           <a:p>
             <a:fld id="{3EA744D9-3FBE-48D8-BF2A-85DF203E4D20}" type="datetimeFigureOut">
               <a:rPr lang="bg-BG" smtClean="0"/>
-              <a:t>20.5.2015 г.</a:t>
+              <a:t>22.5.2015 г.</a:t>
             </a:fld>
             <a:endParaRPr lang="bg-BG"/>
           </a:p>
@@ -2366,7 +2367,7 @@
           <a:p>
             <a:fld id="{3EA744D9-3FBE-48D8-BF2A-85DF203E4D20}" type="datetimeFigureOut">
               <a:rPr lang="bg-BG" smtClean="0"/>
-              <a:t>20.5.2015 г.</a:t>
+              <a:t>22.5.2015 г.</a:t>
             </a:fld>
             <a:endParaRPr lang="bg-BG"/>
           </a:p>
@@ -2461,7 +2462,7 @@
           <a:p>
             <a:fld id="{3EA744D9-3FBE-48D8-BF2A-85DF203E4D20}" type="datetimeFigureOut">
               <a:rPr lang="bg-BG" smtClean="0"/>
-              <a:t>20.5.2015 г.</a:t>
+              <a:t>22.5.2015 г.</a:t>
             </a:fld>
             <a:endParaRPr lang="bg-BG"/>
           </a:p>
@@ -2738,7 +2739,7 @@
           <a:p>
             <a:fld id="{3EA744D9-3FBE-48D8-BF2A-85DF203E4D20}" type="datetimeFigureOut">
               <a:rPr lang="bg-BG" smtClean="0"/>
-              <a:t>20.5.2015 г.</a:t>
+              <a:t>22.5.2015 г.</a:t>
             </a:fld>
             <a:endParaRPr lang="bg-BG"/>
           </a:p>
@@ -2991,7 +2992,7 @@
           <a:p>
             <a:fld id="{3EA744D9-3FBE-48D8-BF2A-85DF203E4D20}" type="datetimeFigureOut">
               <a:rPr lang="bg-BG" smtClean="0"/>
-              <a:t>20.5.2015 г.</a:t>
+              <a:t>22.5.2015 г.</a:t>
             </a:fld>
             <a:endParaRPr lang="bg-BG"/>
           </a:p>
@@ -3213,7 +3214,7 @@
           <a:p>
             <a:fld id="{3EA744D9-3FBE-48D8-BF2A-85DF203E4D20}" type="datetimeFigureOut">
               <a:rPr lang="bg-BG" smtClean="0"/>
-              <a:t>20.5.2015 г.</a:t>
+              <a:t>22.5.2015 г.</a:t>
             </a:fld>
             <a:endParaRPr lang="bg-BG"/>
           </a:p>
@@ -5037,15 +5038,7 @@
                   <a:schemeClr val="accent6"/>
                 </a:solidFill>
               </a:rPr>
-              <a:t>Генериране на случайни </a:t>
-            </a:r>
-            <a:r>
-              <a:rPr lang="ru-RU" sz="4000" dirty="0" smtClean="0">
-                <a:solidFill>
-                  <a:schemeClr val="accent6"/>
-                </a:solidFill>
-              </a:rPr>
-              <a:t>стойности</a:t>
+              <a:t>Генериране на случайни стойности</a:t>
             </a:r>
             <a:endParaRPr lang="bg-BG" sz="4000" dirty="0">
               <a:solidFill>
@@ -5077,148 +5070,45 @@
           </a:bodyPr>
           <a:lstStyle/>
           <a:p>
-            <a:pPr marL="0" indent="0">
-              <a:buNone/>
+            <a:pPr>
+              <a:buFont typeface="Wingdings" panose="05000000000000000000" pitchFamily="2" charset="2"/>
+              <a:buChar char="§"/>
             </a:pPr>
             <a:r>
-              <a:rPr lang="en-US" dirty="0">
-                <a:solidFill>
-                  <a:schemeClr val="bg1">
-                    <a:lumMod val="95000"/>
-                  </a:schemeClr>
-                </a:solidFill>
-              </a:rPr>
-              <a:t>Random rand = new Random();</a:t>
-            </a:r>
-          </a:p>
-          <a:p>
-            <a:pPr marL="0" indent="0">
-              <a:buNone/>
+              <a:rPr lang="ru-RU" dirty="0">
+                <a:solidFill>
+                  <a:schemeClr val="bg1">
+                    <a:lumMod val="95000"/>
+                  </a:schemeClr>
+                </a:solidFill>
+              </a:rPr>
+              <a:t>В сферата на софтуерното инженерство съществува проблем с генериране на случайни стойности</a:t>
+            </a:r>
+          </a:p>
+          <a:p>
+            <a:pPr>
+              <a:buFont typeface="Wingdings" panose="05000000000000000000" pitchFamily="2" charset="2"/>
+              <a:buChar char="§"/>
             </a:pPr>
             <a:r>
-              <a:rPr lang="en-US" dirty="0" err="1">
-                <a:solidFill>
-                  <a:schemeClr val="bg1">
-                    <a:lumMod val="95000"/>
-                  </a:schemeClr>
-                </a:solidFill>
-              </a:rPr>
-              <a:t>int</a:t>
-            </a:r>
-            <a:r>
-              <a:rPr lang="en-US" dirty="0">
-                <a:solidFill>
-                  <a:schemeClr val="bg1">
-                    <a:lumMod val="95000"/>
-                  </a:schemeClr>
-                </a:solidFill>
-              </a:rPr>
-              <a:t> </a:t>
-            </a:r>
-            <a:r>
-              <a:rPr lang="en-US" dirty="0" err="1">
-                <a:solidFill>
-                  <a:schemeClr val="bg1">
-                    <a:lumMod val="95000"/>
-                  </a:schemeClr>
-                </a:solidFill>
-              </a:rPr>
-              <a:t>randomInt</a:t>
-            </a:r>
-            <a:r>
-              <a:rPr lang="en-US" dirty="0">
-                <a:solidFill>
-                  <a:schemeClr val="bg1">
-                    <a:lumMod val="95000"/>
-                  </a:schemeClr>
-                </a:solidFill>
-              </a:rPr>
-              <a:t> = </a:t>
-            </a:r>
-            <a:r>
-              <a:rPr lang="en-US" dirty="0" err="1">
-                <a:solidFill>
-                  <a:schemeClr val="bg1">
-                    <a:lumMod val="95000"/>
-                  </a:schemeClr>
-                </a:solidFill>
-              </a:rPr>
-              <a:t>rand.nextInt</a:t>
-            </a:r>
-            <a:r>
-              <a:rPr lang="en-US" dirty="0">
-                <a:solidFill>
-                  <a:schemeClr val="bg1">
-                    <a:lumMod val="95000"/>
-                  </a:schemeClr>
-                </a:solidFill>
-              </a:rPr>
-              <a:t>();</a:t>
-            </a:r>
-          </a:p>
-          <a:p>
-            <a:pPr marL="0" indent="0">
-              <a:buNone/>
-            </a:pPr>
-            <a:r>
-              <a:rPr lang="en-US" dirty="0" err="1">
-                <a:solidFill>
-                  <a:schemeClr val="bg1">
-                    <a:lumMod val="95000"/>
-                  </a:schemeClr>
-                </a:solidFill>
-              </a:rPr>
-              <a:t>int</a:t>
-            </a:r>
-            <a:r>
-              <a:rPr lang="en-US" dirty="0">
-                <a:solidFill>
-                  <a:schemeClr val="bg1">
-                    <a:lumMod val="95000"/>
-                  </a:schemeClr>
-                </a:solidFill>
-              </a:rPr>
-              <a:t> </a:t>
-            </a:r>
-            <a:r>
-              <a:rPr lang="en-US" dirty="0" err="1">
-                <a:solidFill>
-                  <a:schemeClr val="bg1">
-                    <a:lumMod val="95000"/>
-                  </a:schemeClr>
-                </a:solidFill>
-              </a:rPr>
-              <a:t>randToOneHunged</a:t>
-            </a:r>
-            <a:r>
-              <a:rPr lang="en-US" dirty="0">
-                <a:solidFill>
-                  <a:schemeClr val="bg1">
-                    <a:lumMod val="95000"/>
-                  </a:schemeClr>
-                </a:solidFill>
-              </a:rPr>
-              <a:t> = </a:t>
-            </a:r>
-            <a:r>
-              <a:rPr lang="en-US" dirty="0" err="1">
-                <a:solidFill>
-                  <a:schemeClr val="bg1">
-                    <a:lumMod val="95000"/>
-                  </a:schemeClr>
-                </a:solidFill>
-              </a:rPr>
-              <a:t>rand.nextInt</a:t>
-            </a:r>
-            <a:r>
-              <a:rPr lang="en-US" dirty="0">
-                <a:solidFill>
-                  <a:schemeClr val="bg1">
-                    <a:lumMod val="95000"/>
-                  </a:schemeClr>
-                </a:solidFill>
-              </a:rPr>
-              <a:t>(100);</a:t>
+              <a:rPr lang="ru-RU" dirty="0">
+                <a:solidFill>
+                  <a:schemeClr val="bg1">
+                    <a:lumMod val="95000"/>
+                  </a:schemeClr>
+                </a:solidFill>
+              </a:rPr>
+              <a:t>Генерираните от JAVA стойности се наричат „псевдо случайни</a:t>
+            </a:r>
+            <a:r>
+              <a:rPr lang="ru-RU" dirty="0" smtClean="0">
+                <a:solidFill>
+                  <a:schemeClr val="bg1">
+                    <a:lumMod val="95000"/>
+                  </a:schemeClr>
+                </a:solidFill>
+              </a:rPr>
+              <a:t>“</a:t>
             </a:r>
             <a:endParaRPr lang="ru-RU" dirty="0">
               <a:solidFill>
@@ -5233,7 +5123,7 @@
     </p:spTree>
     <p:extLst>
       <p:ext uri="{BB962C8B-B14F-4D97-AF65-F5344CB8AC3E}">
-        <p14:creationId xmlns:p14="http://schemas.microsoft.com/office/powerpoint/2010/main" val="4101352011"/>
+        <p14:creationId xmlns:p14="http://schemas.microsoft.com/office/powerpoint/2010/main" val="2857569922"/>
       </p:ext>
     </p:extLst>
   </p:cSld>
@@ -5279,34 +5169,34 @@
         </p:nvSpPr>
         <p:spPr>
           <a:xfrm>
-            <a:off x="762000" y="990600"/>
+            <a:off x="838200" y="685800"/>
             <a:ext cx="8229600" cy="1143000"/>
           </a:xfrm>
         </p:spPr>
         <p:txBody>
           <a:bodyPr>
-            <a:normAutofit fontScale="90000"/>
+            <a:normAutofit/>
           </a:bodyPr>
           <a:lstStyle/>
           <a:p>
             <a:pPr algn="l"/>
             <a:r>
-              <a:rPr lang="bg-BG" dirty="0" smtClean="0">
+              <a:rPr lang="ru-RU" sz="4000" dirty="0">
                 <a:solidFill>
                   <a:schemeClr val="accent6"/>
                 </a:solidFill>
               </a:rPr>
-              <a:t>Демо - </a:t>
-            </a:r>
-            <a:r>
-              <a:rPr lang="ru-RU" dirty="0">
+              <a:t>Генериране на случайни </a:t>
+            </a:r>
+            <a:r>
+              <a:rPr lang="ru-RU" sz="4000" dirty="0" smtClean="0">
                 <a:solidFill>
                   <a:schemeClr val="accent6"/>
                 </a:solidFill>
               </a:rPr>
-              <a:t>Генериране на случайни стойности</a:t>
-            </a:r>
-            <a:endParaRPr lang="bg-BG" dirty="0">
+              <a:t>стойности</a:t>
+            </a:r>
+            <a:endParaRPr lang="bg-BG" sz="4000" dirty="0">
               <a:solidFill>
                 <a:schemeClr val="accent6"/>
               </a:solidFill>
@@ -5314,51 +5204,185 @@
           </a:p>
         </p:txBody>
       </p:sp>
-      <p:pic>
-        <p:nvPicPr>
-          <p:cNvPr id="4" name="Picture 2" descr="http://images.wikia.com/sonnywithachance/images/archive/d/d9/20110226213549!So_Random.png"/>
-          <p:cNvPicPr>
-            <a:picLocks noChangeAspect="1" noChangeArrowheads="1"/>
-          </p:cNvPicPr>
-          <p:nvPr/>
-        </p:nvPicPr>
-        <p:blipFill>
-          <a:blip r:embed="rId2">
-            <a:extLst>
-              <a:ext uri="{28A0092B-C50C-407E-A947-70E740481C1C}">
-                <a14:useLocalDpi xmlns:a14="http://schemas.microsoft.com/office/drawing/2010/main" val="0"/>
-              </a:ext>
-            </a:extLst>
-          </a:blip>
-          <a:srcRect/>
-          <a:stretch>
-            <a:fillRect/>
-          </a:stretch>
-        </p:blipFill>
-        <p:spPr bwMode="auto">
+      <p:sp>
+        <p:nvSpPr>
+          <p:cNvPr id="3" name="Content Placeholder 2"/>
+          <p:cNvSpPr>
+            <a:spLocks noGrp="1"/>
+          </p:cNvSpPr>
+          <p:nvPr>
+            <p:ph idx="1"/>
+          </p:nvPr>
+        </p:nvSpPr>
+        <p:spPr>
           <a:xfrm>
-            <a:off x="2438400" y="2590800"/>
-            <a:ext cx="3641818" cy="2120402"/>
+            <a:off x="762000" y="1676400"/>
+            <a:ext cx="7620000" cy="4525963"/>
           </a:xfrm>
-          <a:prstGeom prst="rect">
-            <a:avLst/>
-          </a:prstGeom>
-          <a:noFill/>
-          <a:extLst>
-            <a:ext uri="{909E8E84-426E-40DD-AFC4-6F175D3DCCD1}">
-              <a14:hiddenFill xmlns:a14="http://schemas.microsoft.com/office/drawing/2010/main">
-                <a:solidFill>
-                  <a:srgbClr val="FFFFFF"/>
-                </a:solidFill>
-              </a14:hiddenFill>
-            </a:ext>
-          </a:extLst>
         </p:spPr>
-      </p:pic>
+        <p:txBody>
+          <a:bodyPr>
+            <a:normAutofit/>
+          </a:bodyPr>
+          <a:lstStyle/>
+          <a:p>
+            <a:pPr marL="0" indent="0">
+              <a:buNone/>
+            </a:pPr>
+            <a:r>
+              <a:rPr lang="en-US" dirty="0">
+                <a:solidFill>
+                  <a:schemeClr val="bg1">
+                    <a:lumMod val="95000"/>
+                  </a:schemeClr>
+                </a:solidFill>
+              </a:rPr>
+              <a:t>Random rand = new Random();</a:t>
+            </a:r>
+          </a:p>
+          <a:p>
+            <a:pPr marL="0" indent="0">
+              <a:buNone/>
+            </a:pPr>
+            <a:r>
+              <a:rPr lang="en-US" dirty="0" err="1">
+                <a:solidFill>
+                  <a:schemeClr val="bg1">
+                    <a:lumMod val="95000"/>
+                  </a:schemeClr>
+                </a:solidFill>
+              </a:rPr>
+              <a:t>int</a:t>
+            </a:r>
+            <a:r>
+              <a:rPr lang="en-US" dirty="0">
+                <a:solidFill>
+                  <a:schemeClr val="bg1">
+                    <a:lumMod val="95000"/>
+                  </a:schemeClr>
+                </a:solidFill>
+              </a:rPr>
+              <a:t> </a:t>
+            </a:r>
+            <a:r>
+              <a:rPr lang="en-US" dirty="0" err="1">
+                <a:solidFill>
+                  <a:schemeClr val="bg1">
+                    <a:lumMod val="95000"/>
+                  </a:schemeClr>
+                </a:solidFill>
+              </a:rPr>
+              <a:t>randomInt</a:t>
+            </a:r>
+            <a:r>
+              <a:rPr lang="en-US" dirty="0">
+                <a:solidFill>
+                  <a:schemeClr val="bg1">
+                    <a:lumMod val="95000"/>
+                  </a:schemeClr>
+                </a:solidFill>
+              </a:rPr>
+              <a:t> = </a:t>
+            </a:r>
+            <a:r>
+              <a:rPr lang="en-US" dirty="0" err="1">
+                <a:solidFill>
+                  <a:schemeClr val="bg1">
+                    <a:lumMod val="95000"/>
+                  </a:schemeClr>
+                </a:solidFill>
+              </a:rPr>
+              <a:t>rand.nextInt</a:t>
+            </a:r>
+            <a:r>
+              <a:rPr lang="en-US" dirty="0">
+                <a:solidFill>
+                  <a:schemeClr val="bg1">
+                    <a:lumMod val="95000"/>
+                  </a:schemeClr>
+                </a:solidFill>
+              </a:rPr>
+              <a:t>();</a:t>
+            </a:r>
+          </a:p>
+          <a:p>
+            <a:pPr marL="0" indent="0">
+              <a:buNone/>
+            </a:pPr>
+            <a:r>
+              <a:rPr lang="en-US" dirty="0" err="1">
+                <a:solidFill>
+                  <a:schemeClr val="bg1">
+                    <a:lumMod val="95000"/>
+                  </a:schemeClr>
+                </a:solidFill>
+              </a:rPr>
+              <a:t>int</a:t>
+            </a:r>
+            <a:r>
+              <a:rPr lang="en-US" dirty="0">
+                <a:solidFill>
+                  <a:schemeClr val="bg1">
+                    <a:lumMod val="95000"/>
+                  </a:schemeClr>
+                </a:solidFill>
+              </a:rPr>
+              <a:t> </a:t>
+            </a:r>
+            <a:r>
+              <a:rPr lang="en-US" dirty="0" err="1">
+                <a:solidFill>
+                  <a:schemeClr val="bg1">
+                    <a:lumMod val="95000"/>
+                  </a:schemeClr>
+                </a:solidFill>
+              </a:rPr>
+              <a:t>randToOneHunged</a:t>
+            </a:r>
+            <a:r>
+              <a:rPr lang="en-US" dirty="0">
+                <a:solidFill>
+                  <a:schemeClr val="bg1">
+                    <a:lumMod val="95000"/>
+                  </a:schemeClr>
+                </a:solidFill>
+              </a:rPr>
+              <a:t> = </a:t>
+            </a:r>
+            <a:r>
+              <a:rPr lang="en-US" dirty="0" err="1">
+                <a:solidFill>
+                  <a:schemeClr val="bg1">
+                    <a:lumMod val="95000"/>
+                  </a:schemeClr>
+                </a:solidFill>
+              </a:rPr>
+              <a:t>rand.nextInt</a:t>
+            </a:r>
+            <a:r>
+              <a:rPr lang="en-US" dirty="0">
+                <a:solidFill>
+                  <a:schemeClr val="bg1">
+                    <a:lumMod val="95000"/>
+                  </a:schemeClr>
+                </a:solidFill>
+              </a:rPr>
+              <a:t>(100);</a:t>
+            </a:r>
+            <a:endParaRPr lang="ru-RU" dirty="0">
+              <a:solidFill>
+                <a:schemeClr val="bg1">
+                  <a:lumMod val="95000"/>
+                </a:schemeClr>
+              </a:solidFill>
+            </a:endParaRPr>
+          </a:p>
+        </p:txBody>
+      </p:sp>
     </p:spTree>
     <p:extLst>
       <p:ext uri="{BB962C8B-B14F-4D97-AF65-F5344CB8AC3E}">
-        <p14:creationId xmlns:p14="http://schemas.microsoft.com/office/powerpoint/2010/main" val="3841575562"/>
+        <p14:creationId xmlns:p14="http://schemas.microsoft.com/office/powerpoint/2010/main" val="4101352011"/>
       </p:ext>
     </p:extLst>
   </p:cSld>
@@ -5637,26 +5661,34 @@
         </p:nvSpPr>
         <p:spPr>
           <a:xfrm>
-            <a:off x="838200" y="685800"/>
+            <a:off x="762000" y="990600"/>
             <a:ext cx="8229600" cy="1143000"/>
           </a:xfrm>
         </p:spPr>
         <p:txBody>
           <a:bodyPr>
-            <a:normAutofit/>
+            <a:normAutofit fontScale="90000"/>
           </a:bodyPr>
           <a:lstStyle/>
           <a:p>
             <a:pPr algn="l"/>
             <a:r>
-              <a:rPr lang="bg-BG" sz="4000" dirty="0" smtClean="0">
+              <a:rPr lang="bg-BG" dirty="0" smtClean="0">
                 <a:solidFill>
                   <a:schemeClr val="accent6"/>
                 </a:solidFill>
               </a:rPr>
-              <a:t>Много големи числа</a:t>
-            </a:r>
-            <a:endParaRPr lang="bg-BG" sz="4000" dirty="0">
+              <a:t>Демо - </a:t>
+            </a:r>
+            <a:r>
+              <a:rPr lang="ru-RU" dirty="0">
+                <a:solidFill>
+                  <a:schemeClr val="accent6"/>
+                </a:solidFill>
+              </a:rPr>
+              <a:t>Генериране на случайни стойности</a:t>
+            </a:r>
+            <a:endParaRPr lang="bg-BG" dirty="0">
               <a:solidFill>
                 <a:schemeClr val="accent6"/>
               </a:solidFill>
@@ -5664,118 +5696,51 @@
           </a:p>
         </p:txBody>
       </p:sp>
-      <p:sp>
-        <p:nvSpPr>
-          <p:cNvPr id="3" name="Content Placeholder 2"/>
-          <p:cNvSpPr>
-            <a:spLocks noGrp="1"/>
-          </p:cNvSpPr>
-          <p:nvPr>
-            <p:ph idx="1"/>
-          </p:nvPr>
-        </p:nvSpPr>
-        <p:spPr>
+      <p:pic>
+        <p:nvPicPr>
+          <p:cNvPr id="4" name="Picture 2" descr="http://images.wikia.com/sonnywithachance/images/archive/d/d9/20110226213549!So_Random.png"/>
+          <p:cNvPicPr>
+            <a:picLocks noChangeAspect="1" noChangeArrowheads="1"/>
+          </p:cNvPicPr>
+          <p:nvPr/>
+        </p:nvPicPr>
+        <p:blipFill>
+          <a:blip r:embed="rId2">
+            <a:extLst>
+              <a:ext uri="{28A0092B-C50C-407E-A947-70E740481C1C}">
+                <a14:useLocalDpi xmlns:a14="http://schemas.microsoft.com/office/drawing/2010/main" val="0"/>
+              </a:ext>
+            </a:extLst>
+          </a:blip>
+          <a:srcRect/>
+          <a:stretch>
+            <a:fillRect/>
+          </a:stretch>
+        </p:blipFill>
+        <p:spPr bwMode="auto">
           <a:xfrm>
-            <a:off x="762000" y="1676400"/>
-            <a:ext cx="7620000" cy="4525963"/>
+            <a:off x="2438400" y="2590800"/>
+            <a:ext cx="3641818" cy="2120402"/>
           </a:xfrm>
+          <a:prstGeom prst="rect">
+            <a:avLst/>
+          </a:prstGeom>
+          <a:noFill/>
+          <a:extLst>
+            <a:ext uri="{909E8E84-426E-40DD-AFC4-6F175D3DCCD1}">
+              <a14:hiddenFill xmlns:a14="http://schemas.microsoft.com/office/drawing/2010/main">
+                <a:solidFill>
+                  <a:srgbClr val="FFFFFF"/>
+                </a:solidFill>
+              </a14:hiddenFill>
+            </a:ext>
+          </a:extLst>
         </p:spPr>
-        <p:txBody>
-          <a:bodyPr>
-            <a:normAutofit/>
-          </a:bodyPr>
-          <a:lstStyle/>
-          <a:p>
-            <a:pPr>
-              <a:buFont typeface="Wingdings" panose="05000000000000000000" pitchFamily="2" charset="2"/>
-              <a:buChar char="§"/>
-            </a:pPr>
-            <a:r>
-              <a:rPr lang="ru-RU" dirty="0">
-                <a:solidFill>
-                  <a:schemeClr val="bg1">
-                    <a:lumMod val="95000"/>
-                  </a:schemeClr>
-                </a:solidFill>
-              </a:rPr>
-              <a:t>В сферата на софтуерното инженерство съществува проблем с генериране на случайни стойности</a:t>
-            </a:r>
-          </a:p>
-          <a:p>
-            <a:pPr>
-              <a:buFont typeface="Wingdings" panose="05000000000000000000" pitchFamily="2" charset="2"/>
-              <a:buChar char="§"/>
-            </a:pPr>
-            <a:r>
-              <a:rPr lang="ru-RU" dirty="0">
-                <a:solidFill>
-                  <a:schemeClr val="bg1">
-                    <a:lumMod val="95000"/>
-                  </a:schemeClr>
-                </a:solidFill>
-              </a:rPr>
-              <a:t>Генерираните от JAVA стойности се наричат „псевдо случайни“</a:t>
-            </a:r>
-          </a:p>
-          <a:p>
-            <a:pPr>
-              <a:buFont typeface="Wingdings" panose="05000000000000000000" pitchFamily="2" charset="2"/>
-              <a:buChar char="§"/>
-            </a:pPr>
-            <a:r>
-              <a:rPr lang="ru-RU" dirty="0" smtClean="0">
-                <a:solidFill>
-                  <a:schemeClr val="bg1">
-                    <a:lumMod val="95000"/>
-                  </a:schemeClr>
-                </a:solidFill>
-              </a:rPr>
-              <a:t>Когато се налага да използваме много големи числа</a:t>
-            </a:r>
-            <a:r>
-              <a:rPr lang="en-US" dirty="0" smtClean="0">
-                <a:solidFill>
-                  <a:schemeClr val="bg1">
-                    <a:lumMod val="95000"/>
-                  </a:schemeClr>
-                </a:solidFill>
-              </a:rPr>
-              <a:t>,</a:t>
-            </a:r>
-            <a:r>
-              <a:rPr lang="ru-RU" dirty="0" smtClean="0">
-                <a:solidFill>
-                  <a:schemeClr val="bg1">
-                    <a:lumMod val="95000"/>
-                  </a:schemeClr>
-                </a:solidFill>
-              </a:rPr>
-              <a:t> използваме обекта </a:t>
-            </a:r>
-            <a:r>
-              <a:rPr lang="en-US" b="1" dirty="0" err="1" smtClean="0">
-                <a:solidFill>
-                  <a:schemeClr val="bg1">
-                    <a:lumMod val="95000"/>
-                  </a:schemeClr>
-                </a:solidFill>
-              </a:rPr>
-              <a:t>BigInteger</a:t>
-            </a:r>
-            <a:endParaRPr lang="ru-RU" b="1" dirty="0">
-              <a:solidFill>
-                <a:schemeClr val="bg1">
-                  <a:lumMod val="95000"/>
-                </a:schemeClr>
-              </a:solidFill>
-            </a:endParaRPr>
-          </a:p>
-        </p:txBody>
-      </p:sp>
+      </p:pic>
     </p:spTree>
     <p:extLst>
       <p:ext uri="{BB962C8B-B14F-4D97-AF65-F5344CB8AC3E}">
-        <p14:creationId xmlns:p14="http://schemas.microsoft.com/office/powerpoint/2010/main" val="2857569922"/>
+        <p14:creationId xmlns:p14="http://schemas.microsoft.com/office/powerpoint/2010/main" val="3841575562"/>
       </p:ext>
     </p:extLst>
   </p:cSld>
@@ -5833,6 +5798,168 @@
           <a:p>
             <a:pPr algn="l"/>
             <a:r>
+              <a:rPr lang="bg-BG" sz="4000" dirty="0" smtClean="0">
+                <a:solidFill>
+                  <a:schemeClr val="accent6"/>
+                </a:solidFill>
+              </a:rPr>
+              <a:t>Много големи числа</a:t>
+            </a:r>
+            <a:endParaRPr lang="bg-BG" sz="4000" dirty="0">
+              <a:solidFill>
+                <a:schemeClr val="accent6"/>
+              </a:solidFill>
+            </a:endParaRPr>
+          </a:p>
+        </p:txBody>
+      </p:sp>
+      <p:sp>
+        <p:nvSpPr>
+          <p:cNvPr id="3" name="Content Placeholder 2"/>
+          <p:cNvSpPr>
+            <a:spLocks noGrp="1"/>
+          </p:cNvSpPr>
+          <p:nvPr>
+            <p:ph idx="1"/>
+          </p:nvPr>
+        </p:nvSpPr>
+        <p:spPr>
+          <a:xfrm>
+            <a:off x="762000" y="1676400"/>
+            <a:ext cx="7620000" cy="4525963"/>
+          </a:xfrm>
+        </p:spPr>
+        <p:txBody>
+          <a:bodyPr>
+            <a:normAutofit/>
+          </a:bodyPr>
+          <a:lstStyle/>
+          <a:p>
+            <a:pPr>
+              <a:buFont typeface="Wingdings" panose="05000000000000000000" pitchFamily="2" charset="2"/>
+              <a:buChar char="§"/>
+            </a:pPr>
+            <a:r>
+              <a:rPr lang="ru-RU" dirty="0" smtClean="0">
+                <a:solidFill>
+                  <a:schemeClr val="bg1">
+                    <a:lumMod val="95000"/>
+                  </a:schemeClr>
+                </a:solidFill>
+              </a:rPr>
+              <a:t>Когато </a:t>
+            </a:r>
+            <a:r>
+              <a:rPr lang="ru-RU" dirty="0" smtClean="0">
+                <a:solidFill>
+                  <a:schemeClr val="bg1">
+                    <a:lumMod val="95000"/>
+                  </a:schemeClr>
+                </a:solidFill>
+              </a:rPr>
+              <a:t>се налага да използваме много големи числа</a:t>
+            </a:r>
+            <a:r>
+              <a:rPr lang="en-US" dirty="0" smtClean="0">
+                <a:solidFill>
+                  <a:schemeClr val="bg1">
+                    <a:lumMod val="95000"/>
+                  </a:schemeClr>
+                </a:solidFill>
+              </a:rPr>
+              <a:t>,</a:t>
+            </a:r>
+            <a:r>
+              <a:rPr lang="ru-RU" dirty="0" smtClean="0">
+                <a:solidFill>
+                  <a:schemeClr val="bg1">
+                    <a:lumMod val="95000"/>
+                  </a:schemeClr>
+                </a:solidFill>
+              </a:rPr>
+              <a:t> използваме обекта </a:t>
+            </a:r>
+            <a:r>
+              <a:rPr lang="en-US" b="1" dirty="0" err="1" smtClean="0">
+                <a:solidFill>
+                  <a:schemeClr val="bg1">
+                    <a:lumMod val="95000"/>
+                  </a:schemeClr>
+                </a:solidFill>
+              </a:rPr>
+              <a:t>BigInteger</a:t>
+            </a:r>
+            <a:endParaRPr lang="ru-RU" b="1" dirty="0">
+              <a:solidFill>
+                <a:schemeClr val="bg1">
+                  <a:lumMod val="95000"/>
+                </a:schemeClr>
+              </a:solidFill>
+            </a:endParaRPr>
+          </a:p>
+        </p:txBody>
+      </p:sp>
+    </p:spTree>
+    <p:extLst>
+      <p:ext uri="{BB962C8B-B14F-4D97-AF65-F5344CB8AC3E}">
+        <p14:creationId xmlns:p14="http://schemas.microsoft.com/office/powerpoint/2010/main" val="3241818976"/>
+      </p:ext>
+    </p:extLst>
+  </p:cSld>
+  <p:clrMapOvr>
+    <a:masterClrMapping/>
+  </p:clrMapOvr>
+  <p:timing>
+    <p:tnLst>
+      <p:par>
+        <p:cTn id="1" dur="indefinite" restart="never" nodeType="tmRoot"/>
+      </p:par>
+    </p:tnLst>
+  </p:timing>
+</p:sld>
+</file>
+
+<file path=ppt/slides/slide22.xml><?xml version="1.0" encoding="utf-8"?>
+<p:sld xmlns:a="http://schemas.openxmlformats.org/drawingml/2006/main" xmlns:r="http://schemas.openxmlformats.org/officeDocument/2006/relationships" xmlns:p="http://schemas.openxmlformats.org/presentationml/2006/main">
+  <p:cSld>
+    <p:spTree>
+      <p:nvGrpSpPr>
+        <p:cNvPr id="1" name=""/>
+        <p:cNvGrpSpPr/>
+        <p:nvPr/>
+      </p:nvGrpSpPr>
+      <p:grpSpPr>
+        <a:xfrm>
+          <a:off x="0" y="0"/>
+          <a:ext cx="0" cy="0"/>
+          <a:chOff x="0" y="0"/>
+          <a:chExt cx="0" cy="0"/>
+        </a:xfrm>
+      </p:grpSpPr>
+      <p:sp>
+        <p:nvSpPr>
+          <p:cNvPr id="2" name="Title 1"/>
+          <p:cNvSpPr>
+            <a:spLocks noGrp="1"/>
+          </p:cNvSpPr>
+          <p:nvPr>
+            <p:ph type="title"/>
+          </p:nvPr>
+        </p:nvSpPr>
+        <p:spPr>
+          <a:xfrm>
+            <a:off x="838200" y="685800"/>
+            <a:ext cx="8229600" cy="1143000"/>
+          </a:xfrm>
+        </p:spPr>
+        <p:txBody>
+          <a:bodyPr>
+            <a:normAutofit/>
+          </a:bodyPr>
+          <a:lstStyle/>
+          <a:p>
+            <a:pPr algn="l"/>
+            <a:r>
               <a:rPr lang="bg-BG" sz="4000" dirty="0">
                 <a:solidFill>
                   <a:schemeClr val="accent6"/>
@@ -6028,7 +6155,7 @@
 </p:sld>
 </file>
 
-<file path=ppt/slides/slide22.xml><?xml version="1.0" encoding="utf-8"?>
+<file path=ppt/slides/slide23.xml><?xml version="1.0" encoding="utf-8"?>
 <p:sld xmlns:a="http://schemas.openxmlformats.org/drawingml/2006/main" xmlns:r="http://schemas.openxmlformats.org/officeDocument/2006/relationships" xmlns:p="http://schemas.openxmlformats.org/presentationml/2006/main">
   <p:cSld>
     <p:spTree>
@@ -6171,7 +6298,7 @@
 </p:sld>
 </file>
 
-<file path=ppt/slides/slide23.xml><?xml version="1.0" encoding="utf-8"?>
+<file path=ppt/slides/slide24.xml><?xml version="1.0" encoding="utf-8"?>
 <p:sld xmlns:a="http://schemas.openxmlformats.org/drawingml/2006/main" xmlns:r="http://schemas.openxmlformats.org/officeDocument/2006/relationships" xmlns:p="http://schemas.openxmlformats.org/presentationml/2006/main">
   <p:cSld>
     <p:spTree>
@@ -6358,7 +6485,7 @@
 </p:sld>
 </file>
 
-<file path=ppt/slides/slide24.xml><?xml version="1.0" encoding="utf-8"?>
+<file path=ppt/slides/slide25.xml><?xml version="1.0" encoding="utf-8"?>
 <p:sld xmlns:a="http://schemas.openxmlformats.org/drawingml/2006/main" xmlns:r="http://schemas.openxmlformats.org/officeDocument/2006/relationships" xmlns:p="http://schemas.openxmlformats.org/presentationml/2006/main">
   <p:cSld>
     <p:spTree>
@@ -6475,7 +6602,7 @@
 </p:sld>
 </file>
 
-<file path=ppt/slides/slide25.xml><?xml version="1.0" encoding="utf-8"?>
+<file path=ppt/slides/slide26.xml><?xml version="1.0" encoding="utf-8"?>
 <p:sld xmlns:a="http://schemas.openxmlformats.org/drawingml/2006/main" xmlns:r="http://schemas.openxmlformats.org/officeDocument/2006/relationships" xmlns:p="http://schemas.openxmlformats.org/presentationml/2006/main">
   <p:cSld>
     <p:spTree>
@@ -6654,7 +6781,7 @@
 </p:sld>
 </file>
 
-<file path=ppt/slides/slide26.xml><?xml version="1.0" encoding="utf-8"?>
+<file path=ppt/slides/slide27.xml><?xml version="1.0" encoding="utf-8"?>
 <p:sld xmlns:a="http://schemas.openxmlformats.org/drawingml/2006/main" xmlns:r="http://schemas.openxmlformats.org/officeDocument/2006/relationships" xmlns:p="http://schemas.openxmlformats.org/presentationml/2006/main">
   <p:cSld>
     <p:spTree>
@@ -6771,404 +6898,6 @@
 </p:sld>
 </file>
 
-<file path=ppt/slides/slide27.xml><?xml version="1.0" encoding="utf-8"?>
-<p:sld xmlns:a="http://schemas.openxmlformats.org/drawingml/2006/main" xmlns:r="http://schemas.openxmlformats.org/officeDocument/2006/relationships" xmlns:p="http://schemas.openxmlformats.org/presentationml/2006/main">
-  <p:cSld>
-    <p:spTree>
-      <p:nvGrpSpPr>
-        <p:cNvPr id="1" name=""/>
-        <p:cNvGrpSpPr/>
-        <p:nvPr/>
-      </p:nvGrpSpPr>
-      <p:grpSpPr>
-        <a:xfrm>
-          <a:off x="0" y="0"/>
-          <a:ext cx="0" cy="0"/>
-          <a:chOff x="0" y="0"/>
-          <a:chExt cx="0" cy="0"/>
-        </a:xfrm>
-      </p:grpSpPr>
-      <p:sp>
-        <p:nvSpPr>
-          <p:cNvPr id="2" name="Title 1"/>
-          <p:cNvSpPr>
-            <a:spLocks noGrp="1"/>
-          </p:cNvSpPr>
-          <p:nvPr>
-            <p:ph type="title"/>
-          </p:nvPr>
-        </p:nvSpPr>
-        <p:spPr>
-          <a:xfrm>
-            <a:off x="838200" y="685800"/>
-            <a:ext cx="8229600" cy="1143000"/>
-          </a:xfrm>
-        </p:spPr>
-        <p:txBody>
-          <a:bodyPr>
-            <a:normAutofit/>
-          </a:bodyPr>
-          <a:lstStyle/>
-          <a:p>
-            <a:pPr algn="l"/>
-            <a:r>
-              <a:rPr lang="bg-BG" sz="4000" dirty="0" smtClean="0">
-                <a:solidFill>
-                  <a:schemeClr val="accent6"/>
-                </a:solidFill>
-              </a:rPr>
-              <a:t>Рекурсия</a:t>
-            </a:r>
-            <a:endParaRPr lang="bg-BG" sz="4000" dirty="0">
-              <a:solidFill>
-                <a:schemeClr val="accent6"/>
-              </a:solidFill>
-            </a:endParaRPr>
-          </a:p>
-        </p:txBody>
-      </p:sp>
-      <p:sp>
-        <p:nvSpPr>
-          <p:cNvPr id="3" name="Content Placeholder 2"/>
-          <p:cNvSpPr>
-            <a:spLocks noGrp="1"/>
-          </p:cNvSpPr>
-          <p:nvPr>
-            <p:ph idx="1"/>
-          </p:nvPr>
-        </p:nvSpPr>
-        <p:spPr>
-          <a:xfrm>
-            <a:off x="762000" y="1676400"/>
-            <a:ext cx="7620000" cy="4525963"/>
-          </a:xfrm>
-        </p:spPr>
-        <p:txBody>
-          <a:bodyPr>
-            <a:normAutofit/>
-          </a:bodyPr>
-          <a:lstStyle/>
-          <a:p>
-            <a:pPr>
-              <a:buFont typeface="Wingdings" panose="05000000000000000000" pitchFamily="2" charset="2"/>
-              <a:buChar char="§"/>
-            </a:pPr>
-            <a:r>
-              <a:rPr lang="ru-RU" dirty="0">
-                <a:solidFill>
-                  <a:schemeClr val="bg1">
-                    <a:lumMod val="95000"/>
-                  </a:schemeClr>
-                </a:solidFill>
-              </a:rPr>
-              <a:t>Когато в тялото на метод се извършва обръщение към същия метод, казваме, че методът е пряко рекурсивен.</a:t>
-            </a:r>
-          </a:p>
-          <a:p>
-            <a:pPr>
-              <a:buFont typeface="Wingdings" panose="05000000000000000000" pitchFamily="2" charset="2"/>
-              <a:buChar char="§"/>
-            </a:pPr>
-            <a:r>
-              <a:rPr lang="ru-RU" dirty="0">
-                <a:solidFill>
-                  <a:schemeClr val="bg1">
-                    <a:lumMod val="95000"/>
-                  </a:schemeClr>
-                </a:solidFill>
-              </a:rPr>
-              <a:t>Ако метод </a:t>
-            </a:r>
-            <a:r>
-              <a:rPr lang="en-US" dirty="0">
-                <a:solidFill>
-                  <a:schemeClr val="bg1">
-                    <a:lumMod val="95000"/>
-                  </a:schemeClr>
-                </a:solidFill>
-              </a:rPr>
-              <a:t>X</a:t>
-            </a:r>
-            <a:r>
-              <a:rPr lang="ru-RU" dirty="0" smtClean="0">
-                <a:solidFill>
-                  <a:schemeClr val="bg1">
-                    <a:lumMod val="95000"/>
-                  </a:schemeClr>
-                </a:solidFill>
-              </a:rPr>
-              <a:t> </a:t>
-            </a:r>
-            <a:r>
-              <a:rPr lang="ru-RU" dirty="0">
-                <a:solidFill>
-                  <a:schemeClr val="bg1">
-                    <a:lumMod val="95000"/>
-                  </a:schemeClr>
-                </a:solidFill>
-              </a:rPr>
-              <a:t>се обръща към метод </a:t>
-            </a:r>
-            <a:r>
-              <a:rPr lang="en-US" dirty="0" smtClean="0">
-                <a:solidFill>
-                  <a:schemeClr val="bg1">
-                    <a:lumMod val="95000"/>
-                  </a:schemeClr>
-                </a:solidFill>
-              </a:rPr>
-              <a:t>Y</a:t>
-            </a:r>
-            <a:r>
-              <a:rPr lang="ru-RU" dirty="0" smtClean="0">
-                <a:solidFill>
-                  <a:schemeClr val="bg1">
-                    <a:lumMod val="95000"/>
-                  </a:schemeClr>
-                </a:solidFill>
-              </a:rPr>
-              <a:t>, </a:t>
-            </a:r>
-            <a:r>
-              <a:rPr lang="en-US" dirty="0" smtClean="0">
-                <a:solidFill>
-                  <a:schemeClr val="bg1">
-                    <a:lumMod val="95000"/>
-                  </a:schemeClr>
-                </a:solidFill>
-              </a:rPr>
-              <a:t>Y</a:t>
-            </a:r>
-            <a:r>
-              <a:rPr lang="ru-RU" dirty="0" smtClean="0">
-                <a:solidFill>
-                  <a:schemeClr val="bg1">
-                    <a:lumMod val="95000"/>
-                  </a:schemeClr>
-                </a:solidFill>
-              </a:rPr>
-              <a:t> </a:t>
-            </a:r>
-            <a:r>
-              <a:rPr lang="ru-RU" dirty="0">
-                <a:solidFill>
-                  <a:schemeClr val="bg1">
-                    <a:lumMod val="95000"/>
-                  </a:schemeClr>
-                </a:solidFill>
-              </a:rPr>
-              <a:t>към </a:t>
-            </a:r>
-            <a:r>
-              <a:rPr lang="en-US" dirty="0" smtClean="0">
-                <a:solidFill>
-                  <a:schemeClr val="bg1">
-                    <a:lumMod val="95000"/>
-                  </a:schemeClr>
-                </a:solidFill>
-              </a:rPr>
-              <a:t>Z</a:t>
-            </a:r>
-            <a:r>
-              <a:rPr lang="ru-RU" dirty="0" smtClean="0">
-                <a:solidFill>
-                  <a:schemeClr val="bg1">
-                    <a:lumMod val="95000"/>
-                  </a:schemeClr>
-                </a:solidFill>
-              </a:rPr>
-              <a:t>, </a:t>
-            </a:r>
-            <a:r>
-              <a:rPr lang="ru-RU" dirty="0">
-                <a:solidFill>
-                  <a:schemeClr val="bg1">
-                    <a:lumMod val="95000"/>
-                  </a:schemeClr>
-                </a:solidFill>
-              </a:rPr>
-              <a:t>а </a:t>
-            </a:r>
-            <a:r>
-              <a:rPr lang="en-US" dirty="0" smtClean="0">
-                <a:solidFill>
-                  <a:schemeClr val="bg1">
-                    <a:lumMod val="95000"/>
-                  </a:schemeClr>
-                </a:solidFill>
-              </a:rPr>
-              <a:t>Z</a:t>
-            </a:r>
-            <a:r>
-              <a:rPr lang="ru-RU" dirty="0" smtClean="0">
-                <a:solidFill>
-                  <a:schemeClr val="bg1">
-                    <a:lumMod val="95000"/>
-                  </a:schemeClr>
-                </a:solidFill>
-              </a:rPr>
-              <a:t> </a:t>
-            </a:r>
-            <a:r>
-              <a:rPr lang="ru-RU" dirty="0">
-                <a:solidFill>
-                  <a:schemeClr val="bg1">
-                    <a:lumMod val="95000"/>
-                  </a:schemeClr>
-                </a:solidFill>
-              </a:rPr>
-              <a:t>отново към </a:t>
-            </a:r>
-            <a:r>
-              <a:rPr lang="en-US" dirty="0">
-                <a:solidFill>
-                  <a:schemeClr val="bg1">
-                    <a:lumMod val="95000"/>
-                  </a:schemeClr>
-                </a:solidFill>
-              </a:rPr>
-              <a:t>X</a:t>
-            </a:r>
-            <a:r>
-              <a:rPr lang="ru-RU" dirty="0" smtClean="0">
-                <a:solidFill>
-                  <a:schemeClr val="bg1">
-                    <a:lumMod val="95000"/>
-                  </a:schemeClr>
-                </a:solidFill>
-              </a:rPr>
-              <a:t>, </a:t>
-            </a:r>
-            <a:r>
-              <a:rPr lang="ru-RU" dirty="0">
-                <a:solidFill>
-                  <a:schemeClr val="bg1">
-                    <a:lumMod val="95000"/>
-                  </a:schemeClr>
-                </a:solidFill>
-              </a:rPr>
-              <a:t>казваме, че методът </a:t>
-            </a:r>
-            <a:r>
-              <a:rPr lang="en-US" dirty="0" smtClean="0">
-                <a:solidFill>
-                  <a:schemeClr val="bg1">
-                    <a:lumMod val="95000"/>
-                  </a:schemeClr>
-                </a:solidFill>
-              </a:rPr>
-              <a:t>X</a:t>
-            </a:r>
-            <a:r>
-              <a:rPr lang="ru-RU" dirty="0" smtClean="0">
-                <a:solidFill>
-                  <a:schemeClr val="bg1">
-                    <a:lumMod val="95000"/>
-                  </a:schemeClr>
-                </a:solidFill>
-              </a:rPr>
-              <a:t>, </a:t>
-            </a:r>
-            <a:r>
-              <a:rPr lang="ru-RU" dirty="0">
-                <a:solidFill>
-                  <a:schemeClr val="bg1">
-                    <a:lumMod val="95000"/>
-                  </a:schemeClr>
-                </a:solidFill>
-              </a:rPr>
-              <a:t>заедно с методите </a:t>
-            </a:r>
-            <a:r>
-              <a:rPr lang="en-US" dirty="0" smtClean="0">
-                <a:solidFill>
-                  <a:schemeClr val="bg1">
-                    <a:lumMod val="95000"/>
-                  </a:schemeClr>
-                </a:solidFill>
-              </a:rPr>
-              <a:t>Y</a:t>
-            </a:r>
-            <a:r>
-              <a:rPr lang="ru-RU" dirty="0" smtClean="0">
-                <a:solidFill>
-                  <a:schemeClr val="bg1">
-                    <a:lumMod val="95000"/>
-                  </a:schemeClr>
-                </a:solidFill>
-              </a:rPr>
-              <a:t> </a:t>
-            </a:r>
-            <a:r>
-              <a:rPr lang="ru-RU" dirty="0">
-                <a:solidFill>
-                  <a:schemeClr val="bg1">
-                    <a:lumMod val="95000"/>
-                  </a:schemeClr>
-                </a:solidFill>
-              </a:rPr>
-              <a:t>и </a:t>
-            </a:r>
-            <a:r>
-              <a:rPr lang="en-US" dirty="0" smtClean="0">
-                <a:solidFill>
-                  <a:schemeClr val="bg1">
-                    <a:lumMod val="95000"/>
-                  </a:schemeClr>
-                </a:solidFill>
-              </a:rPr>
-              <a:t>Z</a:t>
-            </a:r>
-            <a:r>
-              <a:rPr lang="ru-RU" dirty="0" smtClean="0">
-                <a:solidFill>
-                  <a:schemeClr val="bg1">
-                    <a:lumMod val="95000"/>
-                  </a:schemeClr>
-                </a:solidFill>
-              </a:rPr>
-              <a:t> </a:t>
-            </a:r>
-            <a:r>
-              <a:rPr lang="ru-RU" dirty="0">
-                <a:solidFill>
-                  <a:schemeClr val="bg1">
-                    <a:lumMod val="95000"/>
-                  </a:schemeClr>
-                </a:solidFill>
-              </a:rPr>
-              <a:t>са непряко (косвено) рекурсивни.</a:t>
-            </a:r>
-            <a:endParaRPr lang="ru-RU" dirty="0">
-              <a:solidFill>
-                <a:schemeClr val="bg1">
-                  <a:lumMod val="95000"/>
-                </a:schemeClr>
-              </a:solidFill>
-            </a:endParaRPr>
-          </a:p>
-        </p:txBody>
-      </p:sp>
-    </p:spTree>
-    <p:extLst>
-      <p:ext uri="{BB962C8B-B14F-4D97-AF65-F5344CB8AC3E}">
-        <p14:creationId xmlns:p14="http://schemas.microsoft.com/office/powerpoint/2010/main" val="2576240524"/>
-      </p:ext>
-    </p:extLst>
-  </p:cSld>
-  <p:clrMapOvr>
-    <a:masterClrMapping/>
-  </p:clrMapOvr>
-  <p:timing>
-    <p:tnLst>
-      <p:par>
-        <p:cTn id="1" dur="indefinite" restart="never" nodeType="tmRoot"/>
-      </p:par>
-    </p:tnLst>
-  </p:timing>
-</p:sld>
-</file>
-
 <file path=ppt/slides/slide28.xml><?xml version="1.0" encoding="utf-8"?>
 <p:sld xmlns:a="http://schemas.openxmlformats.org/drawingml/2006/main" xmlns:r="http://schemas.openxmlformats.org/officeDocument/2006/relationships" xmlns:p="http://schemas.openxmlformats.org/presentationml/2006/main">
   <p:cSld>
@@ -7203,26 +6932,25 @@
           </a:xfrm>
         </p:spPr>
         <p:txBody>
-          <a:bodyPr/>
+          <a:bodyPr>
+            <a:normAutofit/>
+          </a:bodyPr>
           <a:lstStyle/>
           <a:p>
             <a:pPr algn="l"/>
             <a:r>
-              <a:rPr lang="bg-BG" dirty="0" smtClean="0">
+              <a:rPr lang="bg-BG" sz="4000" dirty="0" smtClean="0">
                 <a:solidFill>
                   <a:schemeClr val="accent6"/>
                 </a:solidFill>
               </a:rPr>
-              <a:t>Задач</a:t>
-            </a:r>
-            <a:r>
-              <a:rPr lang="bg-BG" dirty="0">
-                <a:solidFill>
-                  <a:schemeClr val="accent6"/>
-                </a:solidFill>
-              </a:rPr>
-              <a:t>а</a:t>
-            </a:r>
+              <a:t>Видове рекурсия</a:t>
+            </a:r>
+            <a:endParaRPr lang="bg-BG" sz="4000" dirty="0">
+              <a:solidFill>
+                <a:schemeClr val="accent6"/>
+              </a:solidFill>
+            </a:endParaRPr>
           </a:p>
         </p:txBody>
       </p:sp>
@@ -7239,40 +6967,57 @@
         <p:spPr>
           <a:xfrm>
             <a:off x="762000" y="1676400"/>
-            <a:ext cx="7620000" cy="4876800"/>
+            <a:ext cx="7620000" cy="4525963"/>
           </a:xfrm>
         </p:spPr>
         <p:txBody>
           <a:bodyPr>
-            <a:noAutofit/>
+            <a:normAutofit/>
           </a:bodyPr>
           <a:lstStyle/>
           <a:p>
-            <a:pPr marL="0" indent="0">
-              <a:buNone/>
+            <a:pPr>
+              <a:buFont typeface="Wingdings" panose="05000000000000000000" pitchFamily="2" charset="2"/>
+              <a:buChar char="§"/>
             </a:pPr>
             <a:r>
-              <a:rPr lang="ru-RU" sz="2800" dirty="0">
-                <a:solidFill>
-                  <a:schemeClr val="bg1">
-                    <a:lumMod val="95000"/>
-                  </a:schemeClr>
-                </a:solidFill>
-              </a:rPr>
-              <a:t>Да се състави програма на JAVA, която извежда сумата на всички числа от интервала 1 до въведено от конзолата число. Числото трябва да е в интервала [10 </a:t>
-            </a:r>
-            <a:r>
-              <a:rPr lang="ru-RU" sz="2800" dirty="0" smtClean="0">
-                <a:solidFill>
-                  <a:schemeClr val="bg1">
-                    <a:lumMod val="95000"/>
-                  </a:schemeClr>
-                </a:solidFill>
-              </a:rPr>
-              <a:t>– 30</a:t>
-            </a:r>
-            <a:r>
-              <a:rPr lang="en-US" sz="2800" dirty="0" smtClean="0">
+              <a:rPr lang="ru-RU" dirty="0">
+                <a:solidFill>
+                  <a:schemeClr val="bg1">
+                    <a:lumMod val="95000"/>
+                  </a:schemeClr>
+                </a:solidFill>
+              </a:rPr>
+              <a:t>Когато в тялото на метод се извършва обръщение към същия метод, казваме, че методът е пряко рекурсивен.</a:t>
+            </a:r>
+          </a:p>
+          <a:p>
+            <a:pPr>
+              <a:buFont typeface="Wingdings" panose="05000000000000000000" pitchFamily="2" charset="2"/>
+              <a:buChar char="§"/>
+            </a:pPr>
+            <a:r>
+              <a:rPr lang="ru-RU" dirty="0">
+                <a:solidFill>
+                  <a:schemeClr val="bg1">
+                    <a:lumMod val="95000"/>
+                  </a:schemeClr>
+                </a:solidFill>
+              </a:rPr>
+              <a:t>Ако метод </a:t>
+            </a:r>
+            <a:r>
+              <a:rPr lang="en-US" dirty="0">
+                <a:solidFill>
+                  <a:schemeClr val="bg1">
+                    <a:lumMod val="95000"/>
+                  </a:schemeClr>
+                </a:solidFill>
+              </a:rPr>
+              <a:t>X</a:t>
+            </a:r>
+            <a:r>
+              <a:rPr lang="ru-RU" dirty="0" smtClean="0">
                 <a:solidFill>
                   <a:schemeClr val="bg1">
                     <a:lumMod val="95000"/>
@@ -7282,94 +7027,252 @@
               <a:t> </a:t>
             </a:r>
             <a:r>
-              <a:rPr lang="ru-RU" sz="2800" dirty="0" smtClean="0">
-                <a:solidFill>
-                  <a:schemeClr val="bg1">
-                    <a:lumMod val="95000"/>
-                  </a:schemeClr>
-                </a:solidFill>
-              </a:rPr>
-              <a:t>000</a:t>
-            </a:r>
-            <a:r>
-              <a:rPr lang="ru-RU" sz="2800" dirty="0">
-                <a:solidFill>
-                  <a:schemeClr val="bg1">
-                    <a:lumMod val="95000"/>
-                  </a:schemeClr>
-                </a:solidFill>
-              </a:rPr>
-              <a:t>].</a:t>
-            </a:r>
-          </a:p>
-          <a:p>
-            <a:pPr marL="0" indent="0">
-              <a:buNone/>
-            </a:pPr>
-            <a:r>
-              <a:rPr lang="ru-RU" sz="2800" dirty="0">
-                <a:solidFill>
-                  <a:schemeClr val="bg1">
-                    <a:lumMod val="95000"/>
-                  </a:schemeClr>
-                </a:solidFill>
-              </a:rPr>
-              <a:t>Използвайте рекурсия за </a:t>
-            </a:r>
-            <a:r>
-              <a:rPr lang="ru-RU" sz="2800" dirty="0" smtClean="0">
-                <a:solidFill>
-                  <a:schemeClr val="bg1">
-                    <a:lumMod val="95000"/>
-                  </a:schemeClr>
-                </a:solidFill>
-              </a:rPr>
-              <a:t>решението </a:t>
-            </a:r>
-            <a:r>
-              <a:rPr lang="ru-RU" sz="2800" dirty="0">
-                <a:solidFill>
-                  <a:schemeClr val="bg1">
-                    <a:lumMod val="95000"/>
-                  </a:schemeClr>
-                </a:solidFill>
-              </a:rPr>
-              <a:t>на </a:t>
-            </a:r>
-            <a:r>
-              <a:rPr lang="ru-RU" sz="2800" dirty="0" smtClean="0">
-                <a:solidFill>
-                  <a:schemeClr val="bg1">
-                    <a:lumMod val="95000"/>
-                  </a:schemeClr>
-                </a:solidFill>
-              </a:rPr>
-              <a:t>задачата</a:t>
-            </a:r>
-            <a:r>
-              <a:rPr lang="en-US" sz="2800" dirty="0" smtClean="0">
-                <a:solidFill>
-                  <a:schemeClr val="bg1">
-                    <a:lumMod val="95000"/>
-                  </a:schemeClr>
-                </a:solidFill>
-              </a:rPr>
-              <a:t>.</a:t>
-            </a:r>
-            <a:endParaRPr lang="ru-RU" sz="2800" dirty="0">
-              <a:solidFill>
-                <a:schemeClr val="bg1">
-                  <a:lumMod val="95000"/>
-                </a:schemeClr>
-              </a:solidFill>
-            </a:endParaRPr>
+              <a:rPr lang="ru-RU" dirty="0">
+                <a:solidFill>
+                  <a:schemeClr val="bg1">
+                    <a:lumMod val="95000"/>
+                  </a:schemeClr>
+                </a:solidFill>
+              </a:rPr>
+              <a:t>се обръща към метод </a:t>
+            </a:r>
+            <a:r>
+              <a:rPr lang="en-US" dirty="0" smtClean="0">
+                <a:solidFill>
+                  <a:schemeClr val="bg1">
+                    <a:lumMod val="95000"/>
+                  </a:schemeClr>
+                </a:solidFill>
+              </a:rPr>
+              <a:t>Y</a:t>
+            </a:r>
+            <a:r>
+              <a:rPr lang="ru-RU" dirty="0" smtClean="0">
+                <a:solidFill>
+                  <a:schemeClr val="bg1">
+                    <a:lumMod val="95000"/>
+                  </a:schemeClr>
+                </a:solidFill>
+              </a:rPr>
+              <a:t>, </a:t>
+            </a:r>
+            <a:r>
+              <a:rPr lang="en-US" dirty="0" smtClean="0">
+                <a:solidFill>
+                  <a:schemeClr val="bg1">
+                    <a:lumMod val="95000"/>
+                  </a:schemeClr>
+                </a:solidFill>
+              </a:rPr>
+              <a:t>Y</a:t>
+            </a:r>
+            <a:r>
+              <a:rPr lang="ru-RU" dirty="0" smtClean="0">
+                <a:solidFill>
+                  <a:schemeClr val="bg1">
+                    <a:lumMod val="95000"/>
+                  </a:schemeClr>
+                </a:solidFill>
+              </a:rPr>
+              <a:t> </a:t>
+            </a:r>
+            <a:r>
+              <a:rPr lang="ru-RU" dirty="0">
+                <a:solidFill>
+                  <a:schemeClr val="bg1">
+                    <a:lumMod val="95000"/>
+                  </a:schemeClr>
+                </a:solidFill>
+              </a:rPr>
+              <a:t>към </a:t>
+            </a:r>
+            <a:r>
+              <a:rPr lang="en-US" dirty="0" smtClean="0">
+                <a:solidFill>
+                  <a:schemeClr val="bg1">
+                    <a:lumMod val="95000"/>
+                  </a:schemeClr>
+                </a:solidFill>
+              </a:rPr>
+              <a:t>Z</a:t>
+            </a:r>
+            <a:r>
+              <a:rPr lang="ru-RU" dirty="0" smtClean="0">
+                <a:solidFill>
+                  <a:schemeClr val="bg1">
+                    <a:lumMod val="95000"/>
+                  </a:schemeClr>
+                </a:solidFill>
+              </a:rPr>
+              <a:t>, </a:t>
+            </a:r>
+            <a:r>
+              <a:rPr lang="ru-RU" dirty="0">
+                <a:solidFill>
+                  <a:schemeClr val="bg1">
+                    <a:lumMod val="95000"/>
+                  </a:schemeClr>
+                </a:solidFill>
+              </a:rPr>
+              <a:t>а </a:t>
+            </a:r>
+            <a:r>
+              <a:rPr lang="en-US" dirty="0" smtClean="0">
+                <a:solidFill>
+                  <a:schemeClr val="bg1">
+                    <a:lumMod val="95000"/>
+                  </a:schemeClr>
+                </a:solidFill>
+              </a:rPr>
+              <a:t>Z</a:t>
+            </a:r>
+            <a:r>
+              <a:rPr lang="ru-RU" dirty="0" smtClean="0">
+                <a:solidFill>
+                  <a:schemeClr val="bg1">
+                    <a:lumMod val="95000"/>
+                  </a:schemeClr>
+                </a:solidFill>
+              </a:rPr>
+              <a:t> </a:t>
+            </a:r>
+            <a:r>
+              <a:rPr lang="ru-RU" dirty="0">
+                <a:solidFill>
+                  <a:schemeClr val="bg1">
+                    <a:lumMod val="95000"/>
+                  </a:schemeClr>
+                </a:solidFill>
+              </a:rPr>
+              <a:t>отново към </a:t>
+            </a:r>
+            <a:r>
+              <a:rPr lang="en-US" dirty="0">
+                <a:solidFill>
+                  <a:schemeClr val="bg1">
+                    <a:lumMod val="95000"/>
+                  </a:schemeClr>
+                </a:solidFill>
+              </a:rPr>
+              <a:t>X</a:t>
+            </a:r>
+            <a:r>
+              <a:rPr lang="ru-RU" dirty="0" smtClean="0">
+                <a:solidFill>
+                  <a:schemeClr val="bg1">
+                    <a:lumMod val="95000"/>
+                  </a:schemeClr>
+                </a:solidFill>
+              </a:rPr>
+              <a:t>, </a:t>
+            </a:r>
+            <a:r>
+              <a:rPr lang="ru-RU" dirty="0">
+                <a:solidFill>
+                  <a:schemeClr val="bg1">
+                    <a:lumMod val="95000"/>
+                  </a:schemeClr>
+                </a:solidFill>
+              </a:rPr>
+              <a:t>казваме, че методът </a:t>
+            </a:r>
+            <a:r>
+              <a:rPr lang="en-US" dirty="0" smtClean="0">
+                <a:solidFill>
+                  <a:schemeClr val="bg1">
+                    <a:lumMod val="95000"/>
+                  </a:schemeClr>
+                </a:solidFill>
+              </a:rPr>
+              <a:t>X</a:t>
+            </a:r>
+            <a:r>
+              <a:rPr lang="ru-RU" dirty="0" smtClean="0">
+                <a:solidFill>
+                  <a:schemeClr val="bg1">
+                    <a:lumMod val="95000"/>
+                  </a:schemeClr>
+                </a:solidFill>
+              </a:rPr>
+              <a:t>, </a:t>
+            </a:r>
+            <a:r>
+              <a:rPr lang="ru-RU" dirty="0">
+                <a:solidFill>
+                  <a:schemeClr val="bg1">
+                    <a:lumMod val="95000"/>
+                  </a:schemeClr>
+                </a:solidFill>
+              </a:rPr>
+              <a:t>заедно с методите </a:t>
+            </a:r>
+            <a:r>
+              <a:rPr lang="en-US" dirty="0" smtClean="0">
+                <a:solidFill>
+                  <a:schemeClr val="bg1">
+                    <a:lumMod val="95000"/>
+                  </a:schemeClr>
+                </a:solidFill>
+              </a:rPr>
+              <a:t>Y</a:t>
+            </a:r>
+            <a:r>
+              <a:rPr lang="ru-RU" dirty="0" smtClean="0">
+                <a:solidFill>
+                  <a:schemeClr val="bg1">
+                    <a:lumMod val="95000"/>
+                  </a:schemeClr>
+                </a:solidFill>
+              </a:rPr>
+              <a:t> </a:t>
+            </a:r>
+            <a:r>
+              <a:rPr lang="ru-RU" dirty="0">
+                <a:solidFill>
+                  <a:schemeClr val="bg1">
+                    <a:lumMod val="95000"/>
+                  </a:schemeClr>
+                </a:solidFill>
+              </a:rPr>
+              <a:t>и </a:t>
+            </a:r>
+            <a:r>
+              <a:rPr lang="en-US" dirty="0" smtClean="0">
+                <a:solidFill>
+                  <a:schemeClr val="bg1">
+                    <a:lumMod val="95000"/>
+                  </a:schemeClr>
+                </a:solidFill>
+              </a:rPr>
+              <a:t>Z</a:t>
+            </a:r>
+            <a:r>
+              <a:rPr lang="ru-RU" dirty="0" smtClean="0">
+                <a:solidFill>
+                  <a:schemeClr val="bg1">
+                    <a:lumMod val="95000"/>
+                  </a:schemeClr>
+                </a:solidFill>
+              </a:rPr>
+              <a:t> </a:t>
+            </a:r>
+            <a:r>
+              <a:rPr lang="ru-RU" dirty="0">
+                <a:solidFill>
+                  <a:schemeClr val="bg1">
+                    <a:lumMod val="95000"/>
+                  </a:schemeClr>
+                </a:solidFill>
+              </a:rPr>
+              <a:t>са непряко (косвено) рекурсивни.</a:t>
+            </a:r>
           </a:p>
         </p:txBody>
       </p:sp>
     </p:spTree>
     <p:extLst>
       <p:ext uri="{BB962C8B-B14F-4D97-AF65-F5344CB8AC3E}">
-        <p14:creationId xmlns:p14="http://schemas.microsoft.com/office/powerpoint/2010/main" val="4219503475"/>
+        <p14:creationId xmlns:p14="http://schemas.microsoft.com/office/powerpoint/2010/main" val="2576240524"/>
       </p:ext>
     </p:extLst>
   </p:cSld>
@@ -7430,7 +7333,15 @@
                   <a:schemeClr val="accent6"/>
                 </a:solidFill>
               </a:rPr>
-              <a:t>Въпроси</a:t>
+              <a:t>Задач</a:t>
+            </a:r>
+            <a:r>
+              <a:rPr lang="bg-BG" dirty="0">
+                <a:solidFill>
+                  <a:schemeClr val="accent6"/>
+                </a:solidFill>
+              </a:rPr>
+              <a:t>а</a:t>
             </a:r>
             <a:endParaRPr lang="bg-BG" dirty="0">
               <a:solidFill>
@@ -7453,20 +7364,124 @@
         <p:spPr>
           <a:xfrm>
             <a:off x="762000" y="1676400"/>
-            <a:ext cx="7620000" cy="4525963"/>
+            <a:ext cx="7620000" cy="4876800"/>
           </a:xfrm>
         </p:spPr>
         <p:txBody>
           <a:bodyPr>
-            <a:normAutofit/>
+            <a:noAutofit/>
           </a:bodyPr>
           <a:lstStyle/>
           <a:p>
-            <a:pPr>
-              <a:buFont typeface="Wingdings" panose="05000000000000000000" pitchFamily="2" charset="2"/>
-              <a:buChar char="§"/>
+            <a:pPr marL="0" indent="0">
+              <a:buNone/>
             </a:pPr>
-            <a:endParaRPr lang="en-US" dirty="0">
+            <a:r>
+              <a:rPr lang="ru-RU" sz="2800" dirty="0">
+                <a:solidFill>
+                  <a:schemeClr val="bg1">
+                    <a:lumMod val="95000"/>
+                  </a:schemeClr>
+                </a:solidFill>
+              </a:rPr>
+              <a:t>Да се състави програма на JAVA, която извежда сумата на всички числа от интервала 1 до въведено от конзолата число. Числото трябва да е в интервала [10 </a:t>
+            </a:r>
+            <a:r>
+              <a:rPr lang="ru-RU" sz="2800" dirty="0" smtClean="0">
+                <a:solidFill>
+                  <a:schemeClr val="bg1">
+                    <a:lumMod val="95000"/>
+                  </a:schemeClr>
+                </a:solidFill>
+              </a:rPr>
+              <a:t>– 30</a:t>
+            </a:r>
+            <a:r>
+              <a:rPr lang="en-US" sz="2800" dirty="0" smtClean="0">
+                <a:solidFill>
+                  <a:schemeClr val="bg1">
+                    <a:lumMod val="95000"/>
+                  </a:schemeClr>
+                </a:solidFill>
+              </a:rPr>
+              <a:t> </a:t>
+            </a:r>
+            <a:r>
+              <a:rPr lang="ru-RU" sz="2800" dirty="0" smtClean="0">
+                <a:solidFill>
+                  <a:schemeClr val="bg1">
+                    <a:lumMod val="95000"/>
+                  </a:schemeClr>
+                </a:solidFill>
+              </a:rPr>
+              <a:t>000</a:t>
+            </a:r>
+            <a:r>
+              <a:rPr lang="ru-RU" sz="2800" dirty="0">
+                <a:solidFill>
+                  <a:schemeClr val="bg1">
+                    <a:lumMod val="95000"/>
+                  </a:schemeClr>
+                </a:solidFill>
+              </a:rPr>
+              <a:t>].</a:t>
+            </a:r>
+          </a:p>
+          <a:p>
+            <a:pPr marL="0" indent="0">
+              <a:buNone/>
+            </a:pPr>
+            <a:r>
+              <a:rPr lang="ru-RU" sz="2800" dirty="0">
+                <a:solidFill>
+                  <a:schemeClr val="bg1">
+                    <a:lumMod val="95000"/>
+                  </a:schemeClr>
+                </a:solidFill>
+              </a:rPr>
+              <a:t>Използвайте рекурсия за </a:t>
+            </a:r>
+            <a:r>
+              <a:rPr lang="ru-RU" sz="2800" dirty="0" smtClean="0">
+                <a:solidFill>
+                  <a:schemeClr val="bg1">
+                    <a:lumMod val="95000"/>
+                  </a:schemeClr>
+                </a:solidFill>
+              </a:rPr>
+              <a:t>решението </a:t>
+            </a:r>
+            <a:r>
+              <a:rPr lang="ru-RU" sz="2800" dirty="0">
+                <a:solidFill>
+                  <a:schemeClr val="bg1">
+                    <a:lumMod val="95000"/>
+                  </a:schemeClr>
+                </a:solidFill>
+              </a:rPr>
+              <a:t>на </a:t>
+            </a:r>
+            <a:r>
+              <a:rPr lang="ru-RU" sz="2800" dirty="0" smtClean="0">
+                <a:solidFill>
+                  <a:schemeClr val="bg1">
+                    <a:lumMod val="95000"/>
+                  </a:schemeClr>
+                </a:solidFill>
+              </a:rPr>
+              <a:t>задачата</a:t>
+            </a:r>
+            <a:r>
+              <a:rPr lang="en-US" sz="2800" dirty="0" smtClean="0">
+                <a:solidFill>
+                  <a:schemeClr val="bg1">
+                    <a:lumMod val="95000"/>
+                  </a:schemeClr>
+                </a:solidFill>
+              </a:rPr>
+              <a:t>.</a:t>
+            </a:r>
+            <a:endParaRPr lang="ru-RU" sz="2800" dirty="0">
               <a:solidFill>
                 <a:schemeClr val="bg1">
                   <a:lumMod val="95000"/>
@@ -7474,92 +7489,12 @@
               </a:solidFill>
             </a:endParaRPr>
           </a:p>
-          <a:p>
-            <a:pPr>
-              <a:buFont typeface="Wingdings" panose="05000000000000000000" pitchFamily="2" charset="2"/>
-              <a:buChar char="§"/>
-            </a:pPr>
-            <a:endParaRPr lang="en-US" dirty="0">
-              <a:solidFill>
-                <a:schemeClr val="bg1">
-                  <a:lumMod val="95000"/>
-                </a:schemeClr>
-              </a:solidFill>
-            </a:endParaRPr>
-          </a:p>
-          <a:p>
-            <a:pPr>
-              <a:buFont typeface="Wingdings" panose="05000000000000000000" pitchFamily="2" charset="2"/>
-              <a:buChar char="§"/>
-            </a:pPr>
-            <a:endParaRPr lang="en-US" dirty="0">
-              <a:solidFill>
-                <a:schemeClr val="bg1">
-                  <a:lumMod val="95000"/>
-                </a:schemeClr>
-              </a:solidFill>
-            </a:endParaRPr>
-          </a:p>
-          <a:p>
-            <a:pPr>
-              <a:buFont typeface="Wingdings" panose="05000000000000000000" pitchFamily="2" charset="2"/>
-              <a:buChar char="§"/>
-            </a:pPr>
-            <a:endParaRPr lang="en-US" dirty="0">
-              <a:solidFill>
-                <a:schemeClr val="bg1">
-                  <a:lumMod val="95000"/>
-                </a:schemeClr>
-              </a:solidFill>
-            </a:endParaRPr>
-          </a:p>
-        </p:txBody>
-      </p:sp>
-      <p:pic>
-        <p:nvPicPr>
-          <p:cNvPr id="1027" name="Picture 3" descr="C:\Users\Lazar\Desktop\01-red-question-mark1.jpg"/>
-          <p:cNvPicPr>
-            <a:picLocks noChangeAspect="1" noChangeArrowheads="1"/>
-          </p:cNvPicPr>
-          <p:nvPr/>
-        </p:nvPicPr>
-        <p:blipFill>
-          <a:blip r:embed="rId2" cstate="print">
-            <a:extLst>
-              <a:ext uri="{28A0092B-C50C-407E-A947-70E740481C1C}">
-                <a14:useLocalDpi xmlns:a14="http://schemas.microsoft.com/office/drawing/2010/main" val="0"/>
-              </a:ext>
-            </a:extLst>
-          </a:blip>
-          <a:srcRect/>
-          <a:stretch>
-            <a:fillRect/>
-          </a:stretch>
-        </p:blipFill>
-        <p:spPr bwMode="auto">
-          <a:xfrm>
-            <a:off x="3505200" y="2057400"/>
-            <a:ext cx="2419082" cy="2419082"/>
-          </a:xfrm>
-          <a:prstGeom prst="rect">
-            <a:avLst/>
-          </a:prstGeom>
-          <a:noFill/>
-          <a:extLst>
-            <a:ext uri="{909E8E84-426E-40DD-AFC4-6F175D3DCCD1}">
-              <a14:hiddenFill xmlns:a14="http://schemas.microsoft.com/office/drawing/2010/main">
-                <a:solidFill>
-                  <a:srgbClr val="FFFFFF"/>
-                </a:solidFill>
-              </a14:hiddenFill>
-            </a:ext>
-          </a:extLst>
-        </p:spPr>
-      </p:pic>
+        </p:txBody>
+      </p:sp>
     </p:spTree>
     <p:extLst>
       <p:ext uri="{BB962C8B-B14F-4D97-AF65-F5344CB8AC3E}">
-        <p14:creationId xmlns:p14="http://schemas.microsoft.com/office/powerpoint/2010/main" val="3854716579"/>
+        <p14:creationId xmlns:p14="http://schemas.microsoft.com/office/powerpoint/2010/main" val="4219503475"/>
       </p:ext>
     </p:extLst>
   </p:cSld>
@@ -7792,20 +7727,12 @@
           <a:p>
             <a:pPr algn="l"/>
             <a:r>
-              <a:rPr lang="bg-BG" dirty="0" err="1" smtClean="0">
+              <a:rPr lang="bg-BG" dirty="0" smtClean="0">
                 <a:solidFill>
                   <a:schemeClr val="accent6"/>
                 </a:solidFill>
               </a:rPr>
-              <a:t>Задач</a:t>
-            </a:r>
-            <a:r>
-              <a:rPr lang="en-US" dirty="0" smtClean="0">
-                <a:solidFill>
-                  <a:schemeClr val="accent6"/>
-                </a:solidFill>
-              </a:rPr>
-              <a:t>a</a:t>
+              <a:t>Въпроси</a:t>
             </a:r>
             <a:endParaRPr lang="bg-BG" dirty="0">
               <a:solidFill>
@@ -7828,12 +7755,12 @@
         <p:spPr>
           <a:xfrm>
             <a:off x="762000" y="1676400"/>
-            <a:ext cx="7620000" cy="4876800"/>
+            <a:ext cx="7620000" cy="4525963"/>
           </a:xfrm>
         </p:spPr>
         <p:txBody>
           <a:bodyPr>
-            <a:noAutofit/>
+            <a:normAutofit/>
           </a:bodyPr>
           <a:lstStyle/>
           <a:p>
@@ -7841,53 +7768,7 @@
               <a:buFont typeface="Wingdings" panose="05000000000000000000" pitchFamily="2" charset="2"/>
               <a:buChar char="§"/>
             </a:pPr>
-            <a:r>
-              <a:rPr lang="ru-RU" sz="2400" dirty="0">
-                <a:solidFill>
-                  <a:schemeClr val="bg1">
-                    <a:lumMod val="95000"/>
-                  </a:schemeClr>
-                </a:solidFill>
-              </a:rPr>
-              <a:t>Създайте метод maxNumber() с два целочислени (int) параметъра, който връща по-голямото от двете числа. Напишете програма, която прочита три цели числа от конзолата и отпечатва най-голямото от тях, използвайки метода maxNumber().</a:t>
-            </a:r>
-          </a:p>
-          <a:p>
-            <a:pPr>
-              <a:buFont typeface="Wingdings" panose="05000000000000000000" pitchFamily="2" charset="2"/>
-              <a:buChar char="§"/>
-            </a:pPr>
-            <a:r>
-              <a:rPr lang="ru-RU" sz="2400" dirty="0">
-                <a:solidFill>
-                  <a:schemeClr val="bg1">
-                    <a:lumMod val="95000"/>
-                  </a:schemeClr>
-                </a:solidFill>
-              </a:rPr>
-              <a:t>Напишете метод, който при подадено име отпечатва в конзолата "Greeting, &lt;name&gt;!" (Напишете програма, която тества този метод</a:t>
-            </a:r>
-            <a:r>
-              <a:rPr lang="ru-RU" sz="2400" dirty="0" smtClean="0">
-                <a:solidFill>
-                  <a:schemeClr val="bg1">
-                    <a:lumMod val="95000"/>
-                  </a:schemeClr>
-                </a:solidFill>
-              </a:rPr>
-              <a:t>.</a:t>
-            </a:r>
-            <a:r>
-              <a:rPr lang="en-US" sz="2400" dirty="0" smtClean="0">
-                <a:solidFill>
-                  <a:schemeClr val="bg1">
-                    <a:lumMod val="95000"/>
-                  </a:schemeClr>
-                </a:solidFill>
-              </a:rPr>
-              <a:t>)</a:t>
-            </a:r>
-            <a:endParaRPr lang="ru-RU" sz="2400" dirty="0" smtClean="0">
+            <a:endParaRPr lang="en-US" dirty="0">
               <a:solidFill>
                 <a:schemeClr val="bg1">
                   <a:lumMod val="95000"/>
@@ -7900,43 +7781,87 @@
               <a:buFont typeface="Wingdings" panose="05000000000000000000" pitchFamily="2" charset="2"/>
               <a:buChar char="§"/>
             </a:pPr>
-            <a:r>
-              <a:rPr lang="ru-RU" sz="2400" dirty="0" smtClean="0">
-                <a:solidFill>
-                  <a:schemeClr val="bg1">
-                    <a:lumMod val="95000"/>
-                  </a:schemeClr>
-                </a:solidFill>
-              </a:rPr>
-              <a:t>Дефинирайте фунцкия</a:t>
-            </a:r>
-            <a:r>
-              <a:rPr lang="en-US" sz="2400" dirty="0" smtClean="0">
-                <a:solidFill>
-                  <a:schemeClr val="bg1">
-                    <a:lumMod val="95000"/>
-                  </a:schemeClr>
-                </a:solidFill>
-              </a:rPr>
-              <a:t>, </a:t>
-            </a:r>
-            <a:r>
-              <a:rPr lang="ru-RU" sz="2400" dirty="0" smtClean="0">
-                <a:solidFill>
-                  <a:schemeClr val="bg1">
-                    <a:lumMod val="95000"/>
-                  </a:schemeClr>
-                </a:solidFill>
-              </a:rPr>
-              <a:t>която приема 3 параметъра - цели числа и ги умножава едно с друго. Извикайте функцията 20 пъти с рандом генерирани параметри. Изведете резултата на екрана</a:t>
-            </a:r>
-          </a:p>
-        </p:txBody>
-      </p:sp>
+            <a:endParaRPr lang="en-US" dirty="0">
+              <a:solidFill>
+                <a:schemeClr val="bg1">
+                  <a:lumMod val="95000"/>
+                </a:schemeClr>
+              </a:solidFill>
+            </a:endParaRPr>
+          </a:p>
+          <a:p>
+            <a:pPr>
+              <a:buFont typeface="Wingdings" panose="05000000000000000000" pitchFamily="2" charset="2"/>
+              <a:buChar char="§"/>
+            </a:pPr>
+            <a:endParaRPr lang="en-US" dirty="0">
+              <a:solidFill>
+                <a:schemeClr val="bg1">
+                  <a:lumMod val="95000"/>
+                </a:schemeClr>
+              </a:solidFill>
+            </a:endParaRPr>
+          </a:p>
+          <a:p>
+            <a:pPr>
+              <a:buFont typeface="Wingdings" panose="05000000000000000000" pitchFamily="2" charset="2"/>
+              <a:buChar char="§"/>
+            </a:pPr>
+            <a:endParaRPr lang="en-US" dirty="0">
+              <a:solidFill>
+                <a:schemeClr val="bg1">
+                  <a:lumMod val="95000"/>
+                </a:schemeClr>
+              </a:solidFill>
+            </a:endParaRPr>
+          </a:p>
+        </p:txBody>
+      </p:sp>
+      <p:pic>
+        <p:nvPicPr>
+          <p:cNvPr id="1027" name="Picture 3" descr="C:\Users\Lazar\Desktop\01-red-question-mark1.jpg"/>
+          <p:cNvPicPr>
+            <a:picLocks noChangeAspect="1" noChangeArrowheads="1"/>
+          </p:cNvPicPr>
+          <p:nvPr/>
+        </p:nvPicPr>
+        <p:blipFill>
+          <a:blip r:embed="rId2" cstate="print">
+            <a:extLst>
+              <a:ext uri="{28A0092B-C50C-407E-A947-70E740481C1C}">
+                <a14:useLocalDpi xmlns:a14="http://schemas.microsoft.com/office/drawing/2010/main" val="0"/>
+              </a:ext>
+            </a:extLst>
+          </a:blip>
+          <a:srcRect/>
+          <a:stretch>
+            <a:fillRect/>
+          </a:stretch>
+        </p:blipFill>
+        <p:spPr bwMode="auto">
+          <a:xfrm>
+            <a:off x="3505200" y="2057400"/>
+            <a:ext cx="2419082" cy="2419082"/>
+          </a:xfrm>
+          <a:prstGeom prst="rect">
+            <a:avLst/>
+          </a:prstGeom>
+          <a:noFill/>
+          <a:extLst>
+            <a:ext uri="{909E8E84-426E-40DD-AFC4-6F175D3DCCD1}">
+              <a14:hiddenFill xmlns:a14="http://schemas.microsoft.com/office/drawing/2010/main">
+                <a:solidFill>
+                  <a:srgbClr val="FFFFFF"/>
+                </a:solidFill>
+              </a14:hiddenFill>
+            </a:ext>
+          </a:extLst>
+        </p:spPr>
+      </p:pic>
     </p:spTree>
     <p:extLst>
       <p:ext uri="{BB962C8B-B14F-4D97-AF65-F5344CB8AC3E}">
-        <p14:creationId xmlns:p14="http://schemas.microsoft.com/office/powerpoint/2010/main" val="523573951"/>
+        <p14:creationId xmlns:p14="http://schemas.microsoft.com/office/powerpoint/2010/main" val="3854716579"/>
       </p:ext>
     </p:extLst>
   </p:cSld>
@@ -7992,20 +7917,12 @@
           <a:p>
             <a:pPr algn="l"/>
             <a:r>
-              <a:rPr lang="bg-BG" dirty="0" err="1" smtClean="0">
+              <a:rPr lang="bg-BG" dirty="0">
                 <a:solidFill>
                   <a:schemeClr val="accent6"/>
                 </a:solidFill>
               </a:rPr>
-              <a:t>Задач</a:t>
-            </a:r>
-            <a:r>
-              <a:rPr lang="en-US" dirty="0" smtClean="0">
-                <a:solidFill>
-                  <a:schemeClr val="accent6"/>
-                </a:solidFill>
-              </a:rPr>
-              <a:t>a</a:t>
+              <a:t>Задачи за домашна работа</a:t>
             </a:r>
             <a:endParaRPr lang="bg-BG" dirty="0">
               <a:solidFill>
@@ -8049,177 +7966,7 @@
                   </a:schemeClr>
                 </a:solidFill>
               </a:rPr>
-              <a:t>Дефинирайте </a:t>
-            </a:r>
-            <a:r>
-              <a:rPr lang="ru-RU" sz="2400" dirty="0" smtClean="0">
-                <a:solidFill>
-                  <a:schemeClr val="bg1">
-                    <a:lumMod val="95000"/>
-                  </a:schemeClr>
-                </a:solidFill>
-              </a:rPr>
-              <a:t>функция</a:t>
-            </a:r>
-            <a:r>
-              <a:rPr lang="en-US" sz="2400" dirty="0" smtClean="0">
-                <a:solidFill>
-                  <a:schemeClr val="bg1">
-                    <a:lumMod val="95000"/>
-                  </a:schemeClr>
-                </a:solidFill>
-              </a:rPr>
-              <a:t>,</a:t>
-            </a:r>
-            <a:r>
-              <a:rPr lang="ru-RU" sz="2400" dirty="0" smtClean="0">
-                <a:solidFill>
-                  <a:schemeClr val="bg1">
-                    <a:lumMod val="95000"/>
-                  </a:schemeClr>
-                </a:solidFill>
-              </a:rPr>
-              <a:t> </a:t>
-            </a:r>
-            <a:r>
-              <a:rPr lang="ru-RU" sz="2400" dirty="0">
-                <a:solidFill>
-                  <a:schemeClr val="bg1">
-                    <a:lumMod val="95000"/>
-                  </a:schemeClr>
-                </a:solidFill>
-              </a:rPr>
-              <a:t>която приема </a:t>
-            </a:r>
-            <a:r>
-              <a:rPr lang="bg-BG" sz="2400" dirty="0" smtClean="0">
-                <a:solidFill>
-                  <a:schemeClr val="bg1">
-                    <a:lumMod val="95000"/>
-                  </a:schemeClr>
-                </a:solidFill>
-              </a:rPr>
-              <a:t>един</a:t>
-            </a:r>
-            <a:r>
-              <a:rPr lang="ru-RU" sz="2400" dirty="0" smtClean="0">
-                <a:solidFill>
-                  <a:schemeClr val="bg1">
-                    <a:lumMod val="95000"/>
-                  </a:schemeClr>
-                </a:solidFill>
-              </a:rPr>
-              <a:t> </a:t>
-            </a:r>
-            <a:r>
-              <a:rPr lang="ru-RU" sz="2400" dirty="0">
-                <a:solidFill>
-                  <a:schemeClr val="bg1">
-                    <a:lumMod val="95000"/>
-                  </a:schemeClr>
-                </a:solidFill>
-              </a:rPr>
-              <a:t>параметър </a:t>
-            </a:r>
-            <a:r>
-              <a:rPr lang="ru-RU" sz="2400" dirty="0" smtClean="0">
-                <a:solidFill>
-                  <a:schemeClr val="bg1">
-                    <a:lumMod val="95000"/>
-                  </a:schemeClr>
-                </a:solidFill>
-              </a:rPr>
-              <a:t>– число, </a:t>
-            </a:r>
-            <a:r>
-              <a:rPr lang="ru-RU" sz="2400" dirty="0">
-                <a:solidFill>
-                  <a:schemeClr val="bg1">
-                    <a:lumMod val="95000"/>
-                  </a:schemeClr>
-                </a:solidFill>
-              </a:rPr>
-              <a:t>и принтира на екрана "</a:t>
-            </a:r>
-            <a:r>
-              <a:rPr lang="ru-RU" sz="2400" dirty="0" smtClean="0">
-                <a:solidFill>
-                  <a:schemeClr val="bg1">
-                    <a:lumMod val="95000"/>
-                  </a:schemeClr>
-                </a:solidFill>
-              </a:rPr>
-              <a:t>четно«, </a:t>
-            </a:r>
-            <a:r>
-              <a:rPr lang="ru-RU" sz="2400" dirty="0">
-                <a:solidFill>
-                  <a:schemeClr val="bg1">
-                    <a:lumMod val="95000"/>
-                  </a:schemeClr>
-                </a:solidFill>
-              </a:rPr>
-              <a:t>ако числото е </a:t>
-            </a:r>
-            <a:r>
-              <a:rPr lang="ru-RU" sz="2400" dirty="0" smtClean="0">
-                <a:solidFill>
-                  <a:schemeClr val="bg1">
-                    <a:lumMod val="95000"/>
-                  </a:schemeClr>
-                </a:solidFill>
-              </a:rPr>
-              <a:t>четно, </a:t>
-            </a:r>
-            <a:r>
-              <a:rPr lang="ru-RU" sz="2400" dirty="0">
-                <a:solidFill>
-                  <a:schemeClr val="bg1">
-                    <a:lumMod val="95000"/>
-                  </a:schemeClr>
-                </a:solidFill>
-              </a:rPr>
-              <a:t>и "</a:t>
-            </a:r>
-            <a:r>
-              <a:rPr lang="ru-RU" sz="2400" dirty="0" smtClean="0">
-                <a:solidFill>
-                  <a:schemeClr val="bg1">
-                    <a:lumMod val="95000"/>
-                  </a:schemeClr>
-                </a:solidFill>
-              </a:rPr>
-              <a:t>нечетно</a:t>
-            </a:r>
-            <a:r>
-              <a:rPr lang="ru-RU" sz="2400" dirty="0">
-                <a:solidFill>
-                  <a:schemeClr val="bg1">
-                    <a:lumMod val="95000"/>
-                  </a:schemeClr>
-                </a:solidFill>
-              </a:rPr>
-              <a:t> "</a:t>
-            </a:r>
-            <a:r>
-              <a:rPr lang="ru-RU" sz="2400" dirty="0" smtClean="0">
-                <a:solidFill>
-                  <a:schemeClr val="bg1">
-                    <a:lumMod val="95000"/>
-                  </a:schemeClr>
-                </a:solidFill>
-              </a:rPr>
-              <a:t>, </a:t>
-            </a:r>
-            <a:r>
-              <a:rPr lang="ru-RU" sz="2400" dirty="0">
-                <a:solidFill>
-                  <a:schemeClr val="bg1">
-                    <a:lumMod val="95000"/>
-                  </a:schemeClr>
-                </a:solidFill>
-              </a:rPr>
-              <a:t>ако числото е нечетно. Демонстрирайте действието на фукцията с няколко примера</a:t>
+              <a:t>Създайте метод maxNumber() с два целочислени (int) параметъра, който връща по-голямото от двете числа. Напишете програма, която прочита три цели числа от конзолата и отпечатва най-голямото от тях, използвайки метода maxNumber().</a:t>
             </a:r>
           </a:p>
           <a:p>
@@ -8235,7 +7982,7 @@
                   </a:schemeClr>
                 </a:solidFill>
               </a:rPr>
-              <a:t>Направете програма с </a:t>
+              <a:t>Напишете метод, който при подадено име отпечатва в конзолата "Greeting, &lt;name&gt;!" (Напишете програма, която тества този метод</a:t>
             </a:r>
             <a:r>
               <a:rPr lang="ru-RU" sz="2400" dirty="0" smtClean="0">
@@ -8245,27 +7992,7 @@
                   </a:schemeClr>
                 </a:solidFill>
               </a:rPr>
-              <a:t>функция, </a:t>
-            </a:r>
-            <a:r>
-              <a:rPr lang="ru-RU" sz="2400" dirty="0">
-                <a:solidFill>
-                  <a:schemeClr val="bg1">
-                    <a:lumMod val="95000"/>
-                  </a:schemeClr>
-                </a:solidFill>
-              </a:rPr>
-              <a:t>която принтира всички симетрични числа в интервала </a:t>
-            </a:r>
-            <a:r>
-              <a:rPr lang="ru-RU" sz="2400" dirty="0" smtClean="0">
-                <a:solidFill>
-                  <a:schemeClr val="bg1">
-                    <a:lumMod val="95000"/>
-                  </a:schemeClr>
-                </a:solidFill>
-              </a:rPr>
-              <a:t>[</a:t>
+              <a:t>.</a:t>
             </a:r>
             <a:r>
               <a:rPr lang="en-US" sz="2400" dirty="0" smtClean="0">
@@ -8275,103 +8002,9 @@
                   </a:schemeClr>
                 </a:solidFill>
               </a:rPr>
-              <a:t>10</a:t>
-            </a:r>
-            <a:r>
-              <a:rPr lang="ru-RU" sz="2400" dirty="0" smtClean="0">
-                <a:solidFill>
-                  <a:schemeClr val="bg1">
-                    <a:lumMod val="95000"/>
-                  </a:schemeClr>
-                </a:solidFill>
-              </a:rPr>
-              <a:t> </a:t>
-            </a:r>
-            <a:r>
-              <a:rPr lang="ru-RU" sz="2400" dirty="0">
-                <a:solidFill>
-                  <a:schemeClr val="bg1">
-                    <a:lumMod val="95000"/>
-                  </a:schemeClr>
-                </a:solidFill>
-              </a:rPr>
-              <a:t>; 999]</a:t>
-            </a:r>
-          </a:p>
-          <a:p>
-            <a:pPr marL="400050" lvl="1" indent="0">
-              <a:buNone/>
-            </a:pPr>
-            <a:r>
-              <a:rPr lang="ru-RU" sz="2000" dirty="0" smtClean="0">
-                <a:solidFill>
-                  <a:schemeClr val="accent6"/>
-                </a:solidFill>
-              </a:rPr>
-              <a:t>Симетрично </a:t>
-            </a:r>
-            <a:r>
-              <a:rPr lang="ru-RU" sz="2000" dirty="0">
-                <a:solidFill>
-                  <a:schemeClr val="accent6"/>
-                </a:solidFill>
-              </a:rPr>
-              <a:t>число е </a:t>
-            </a:r>
-            <a:r>
-              <a:rPr lang="ru-RU" sz="2000" dirty="0" smtClean="0">
-                <a:solidFill>
-                  <a:schemeClr val="accent6"/>
-                </a:solidFill>
-              </a:rPr>
-              <a:t>число, </a:t>
-            </a:r>
-            <a:r>
-              <a:rPr lang="ru-RU" sz="2000" dirty="0">
-                <a:solidFill>
-                  <a:schemeClr val="accent6"/>
-                </a:solidFill>
-              </a:rPr>
-              <a:t>на което цифрите са симетрични спрямо средата Например: </a:t>
-            </a:r>
-            <a:r>
-              <a:rPr lang="en-US" sz="2000" dirty="0" smtClean="0">
-                <a:solidFill>
-                  <a:schemeClr val="accent6"/>
-                </a:solidFill>
-              </a:rPr>
-              <a:t>11, 22, </a:t>
-            </a:r>
-            <a:r>
-              <a:rPr lang="ru-RU" sz="2000" dirty="0" smtClean="0">
-                <a:solidFill>
-                  <a:schemeClr val="accent6"/>
-                </a:solidFill>
-              </a:rPr>
-              <a:t>101</a:t>
-            </a:r>
-            <a:r>
-              <a:rPr lang="ru-RU" sz="2000" dirty="0">
-                <a:solidFill>
-                  <a:schemeClr val="accent6"/>
-                </a:solidFill>
-              </a:rPr>
-              <a:t>, </a:t>
-            </a:r>
-            <a:r>
-              <a:rPr lang="ru-RU" sz="2000" dirty="0" smtClean="0">
-                <a:solidFill>
-                  <a:schemeClr val="accent6"/>
-                </a:solidFill>
-              </a:rPr>
-              <a:t>303,</a:t>
-            </a:r>
-          </a:p>
-          <a:p>
-            <a:pPr marL="400050" lvl="1" indent="0">
-              <a:buNone/>
-            </a:pPr>
-            <a:endParaRPr lang="ru-RU" sz="2000" dirty="0">
+              <a:t>)</a:t>
+            </a:r>
+            <a:endParaRPr lang="ru-RU" sz="2400" dirty="0" smtClean="0">
               <a:solidFill>
                 <a:schemeClr val="bg1">
                   <a:lumMod val="95000"/>
@@ -8379,12 +8012,48 @@
               </a:solidFill>
             </a:endParaRPr>
           </a:p>
+          <a:p>
+            <a:pPr>
+              <a:buFont typeface="Wingdings" panose="05000000000000000000" pitchFamily="2" charset="2"/>
+              <a:buChar char="§"/>
+            </a:pPr>
+            <a:r>
+              <a:rPr lang="ru-RU" sz="2400" dirty="0" smtClean="0">
+                <a:solidFill>
+                  <a:schemeClr val="bg1">
+                    <a:lumMod val="95000"/>
+                  </a:schemeClr>
+                </a:solidFill>
+              </a:rPr>
+              <a:t>Дефинирайте фунцкия</a:t>
+            </a:r>
+            <a:r>
+              <a:rPr lang="en-US" sz="2400" dirty="0" smtClean="0">
+                <a:solidFill>
+                  <a:schemeClr val="bg1">
+                    <a:lumMod val="95000"/>
+                  </a:schemeClr>
+                </a:solidFill>
+              </a:rPr>
+              <a:t>, </a:t>
+            </a:r>
+            <a:r>
+              <a:rPr lang="ru-RU" sz="2400" dirty="0" smtClean="0">
+                <a:solidFill>
+                  <a:schemeClr val="bg1">
+                    <a:lumMod val="95000"/>
+                  </a:schemeClr>
+                </a:solidFill>
+              </a:rPr>
+              <a:t>която приема 3 параметъра - цели числа и ги умножава едно с друго. Извикайте функцията 20 пъти с рандом генерирани параметри. Изведете резултата на екрана</a:t>
+            </a:r>
+          </a:p>
         </p:txBody>
       </p:sp>
     </p:spTree>
     <p:extLst>
       <p:ext uri="{BB962C8B-B14F-4D97-AF65-F5344CB8AC3E}">
-        <p14:creationId xmlns:p14="http://schemas.microsoft.com/office/powerpoint/2010/main" val="1457439091"/>
+        <p14:creationId xmlns:p14="http://schemas.microsoft.com/office/powerpoint/2010/main" val="523573951"/>
       </p:ext>
     </p:extLst>
   </p:cSld>
@@ -8440,20 +8109,460 @@
           <a:p>
             <a:pPr algn="l"/>
             <a:r>
-              <a:rPr lang="bg-BG" dirty="0" err="1" smtClean="0">
+              <a:rPr lang="bg-BG" dirty="0">
                 <a:solidFill>
                   <a:schemeClr val="accent6"/>
                 </a:solidFill>
               </a:rPr>
-              <a:t>Задач</a:t>
-            </a:r>
-            <a:r>
-              <a:rPr lang="en-US" dirty="0" smtClean="0">
+              <a:t>Задачи за домашна </a:t>
+            </a:r>
+            <a:r>
+              <a:rPr lang="bg-BG" dirty="0" smtClean="0">
                 <a:solidFill>
                   <a:schemeClr val="accent6"/>
                 </a:solidFill>
               </a:rPr>
-              <a:t>a</a:t>
+              <a:t>работа</a:t>
+            </a:r>
+            <a:endParaRPr lang="bg-BG" dirty="0">
+              <a:solidFill>
+                <a:schemeClr val="accent6"/>
+              </a:solidFill>
+            </a:endParaRPr>
+          </a:p>
+        </p:txBody>
+      </p:sp>
+      <p:sp>
+        <p:nvSpPr>
+          <p:cNvPr id="3" name="Content Placeholder 2"/>
+          <p:cNvSpPr>
+            <a:spLocks noGrp="1"/>
+          </p:cNvSpPr>
+          <p:nvPr>
+            <p:ph idx="1"/>
+          </p:nvPr>
+        </p:nvSpPr>
+        <p:spPr>
+          <a:xfrm>
+            <a:off x="762000" y="1676400"/>
+            <a:ext cx="7620000" cy="4876800"/>
+          </a:xfrm>
+        </p:spPr>
+        <p:txBody>
+          <a:bodyPr>
+            <a:noAutofit/>
+          </a:bodyPr>
+          <a:lstStyle/>
+          <a:p>
+            <a:pPr>
+              <a:buFont typeface="Wingdings" panose="05000000000000000000" pitchFamily="2" charset="2"/>
+              <a:buChar char="§"/>
+            </a:pPr>
+            <a:r>
+              <a:rPr lang="ru-RU" sz="2400" dirty="0">
+                <a:solidFill>
+                  <a:schemeClr val="bg1">
+                    <a:lumMod val="95000"/>
+                  </a:schemeClr>
+                </a:solidFill>
+              </a:rPr>
+              <a:t>Дефинирайте </a:t>
+            </a:r>
+            <a:r>
+              <a:rPr lang="ru-RU" sz="2400" dirty="0" smtClean="0">
+                <a:solidFill>
+                  <a:schemeClr val="bg1">
+                    <a:lumMod val="95000"/>
+                  </a:schemeClr>
+                </a:solidFill>
+              </a:rPr>
+              <a:t>функция</a:t>
+            </a:r>
+            <a:r>
+              <a:rPr lang="en-US" sz="2400" dirty="0" smtClean="0">
+                <a:solidFill>
+                  <a:schemeClr val="bg1">
+                    <a:lumMod val="95000"/>
+                  </a:schemeClr>
+                </a:solidFill>
+              </a:rPr>
+              <a:t>,</a:t>
+            </a:r>
+            <a:r>
+              <a:rPr lang="ru-RU" sz="2400" dirty="0" smtClean="0">
+                <a:solidFill>
+                  <a:schemeClr val="bg1">
+                    <a:lumMod val="95000"/>
+                  </a:schemeClr>
+                </a:solidFill>
+              </a:rPr>
+              <a:t> </a:t>
+            </a:r>
+            <a:r>
+              <a:rPr lang="ru-RU" sz="2400" dirty="0">
+                <a:solidFill>
+                  <a:schemeClr val="bg1">
+                    <a:lumMod val="95000"/>
+                  </a:schemeClr>
+                </a:solidFill>
+              </a:rPr>
+              <a:t>която приема </a:t>
+            </a:r>
+            <a:r>
+              <a:rPr lang="bg-BG" sz="2400" dirty="0" smtClean="0">
+                <a:solidFill>
+                  <a:schemeClr val="bg1">
+                    <a:lumMod val="95000"/>
+                  </a:schemeClr>
+                </a:solidFill>
+              </a:rPr>
+              <a:t>един</a:t>
+            </a:r>
+            <a:r>
+              <a:rPr lang="ru-RU" sz="2400" dirty="0" smtClean="0">
+                <a:solidFill>
+                  <a:schemeClr val="bg1">
+                    <a:lumMod val="95000"/>
+                  </a:schemeClr>
+                </a:solidFill>
+              </a:rPr>
+              <a:t> </a:t>
+            </a:r>
+            <a:r>
+              <a:rPr lang="ru-RU" sz="2400" dirty="0">
+                <a:solidFill>
+                  <a:schemeClr val="bg1">
+                    <a:lumMod val="95000"/>
+                  </a:schemeClr>
+                </a:solidFill>
+              </a:rPr>
+              <a:t>параметър </a:t>
+            </a:r>
+            <a:r>
+              <a:rPr lang="ru-RU" sz="2400" dirty="0" smtClean="0">
+                <a:solidFill>
+                  <a:schemeClr val="bg1">
+                    <a:lumMod val="95000"/>
+                  </a:schemeClr>
+                </a:solidFill>
+              </a:rPr>
+              <a:t>– число, </a:t>
+            </a:r>
+            <a:r>
+              <a:rPr lang="ru-RU" sz="2400" dirty="0">
+                <a:solidFill>
+                  <a:schemeClr val="bg1">
+                    <a:lumMod val="95000"/>
+                  </a:schemeClr>
+                </a:solidFill>
+              </a:rPr>
+              <a:t>и принтира на екрана "</a:t>
+            </a:r>
+            <a:r>
+              <a:rPr lang="ru-RU" sz="2400" dirty="0" smtClean="0">
+                <a:solidFill>
+                  <a:schemeClr val="bg1">
+                    <a:lumMod val="95000"/>
+                  </a:schemeClr>
+                </a:solidFill>
+              </a:rPr>
+              <a:t>четно«, </a:t>
+            </a:r>
+            <a:r>
+              <a:rPr lang="ru-RU" sz="2400" dirty="0">
+                <a:solidFill>
+                  <a:schemeClr val="bg1">
+                    <a:lumMod val="95000"/>
+                  </a:schemeClr>
+                </a:solidFill>
+              </a:rPr>
+              <a:t>ако числото е </a:t>
+            </a:r>
+            <a:r>
+              <a:rPr lang="ru-RU" sz="2400" dirty="0" smtClean="0">
+                <a:solidFill>
+                  <a:schemeClr val="bg1">
+                    <a:lumMod val="95000"/>
+                  </a:schemeClr>
+                </a:solidFill>
+              </a:rPr>
+              <a:t>четно, </a:t>
+            </a:r>
+            <a:r>
+              <a:rPr lang="ru-RU" sz="2400" dirty="0">
+                <a:solidFill>
+                  <a:schemeClr val="bg1">
+                    <a:lumMod val="95000"/>
+                  </a:schemeClr>
+                </a:solidFill>
+              </a:rPr>
+              <a:t>и "</a:t>
+            </a:r>
+            <a:r>
+              <a:rPr lang="ru-RU" sz="2400" dirty="0" smtClean="0">
+                <a:solidFill>
+                  <a:schemeClr val="bg1">
+                    <a:lumMod val="95000"/>
+                  </a:schemeClr>
+                </a:solidFill>
+              </a:rPr>
+              <a:t>нечетно</a:t>
+            </a:r>
+            <a:r>
+              <a:rPr lang="ru-RU" sz="2400" dirty="0">
+                <a:solidFill>
+                  <a:schemeClr val="bg1">
+                    <a:lumMod val="95000"/>
+                  </a:schemeClr>
+                </a:solidFill>
+              </a:rPr>
+              <a:t> "</a:t>
+            </a:r>
+            <a:r>
+              <a:rPr lang="ru-RU" sz="2400" dirty="0" smtClean="0">
+                <a:solidFill>
+                  <a:schemeClr val="bg1">
+                    <a:lumMod val="95000"/>
+                  </a:schemeClr>
+                </a:solidFill>
+              </a:rPr>
+              <a:t>, </a:t>
+            </a:r>
+            <a:r>
+              <a:rPr lang="ru-RU" sz="2400" dirty="0">
+                <a:solidFill>
+                  <a:schemeClr val="bg1">
+                    <a:lumMod val="95000"/>
+                  </a:schemeClr>
+                </a:solidFill>
+              </a:rPr>
+              <a:t>ако числото е нечетно. Демонстрирайте действието на фукцията с няколко примера</a:t>
+            </a:r>
+          </a:p>
+          <a:p>
+            <a:pPr>
+              <a:buFont typeface="Wingdings" panose="05000000000000000000" pitchFamily="2" charset="2"/>
+              <a:buChar char="§"/>
+            </a:pPr>
+            <a:r>
+              <a:rPr lang="ru-RU" sz="2400" dirty="0">
+                <a:solidFill>
+                  <a:schemeClr val="bg1">
+                    <a:lumMod val="95000"/>
+                  </a:schemeClr>
+                </a:solidFill>
+              </a:rPr>
+              <a:t>Направете програма с </a:t>
+            </a:r>
+            <a:r>
+              <a:rPr lang="ru-RU" sz="2400" dirty="0" smtClean="0">
+                <a:solidFill>
+                  <a:schemeClr val="bg1">
+                    <a:lumMod val="95000"/>
+                  </a:schemeClr>
+                </a:solidFill>
+              </a:rPr>
+              <a:t>функция, </a:t>
+            </a:r>
+            <a:r>
+              <a:rPr lang="ru-RU" sz="2400" dirty="0">
+                <a:solidFill>
+                  <a:schemeClr val="bg1">
+                    <a:lumMod val="95000"/>
+                  </a:schemeClr>
+                </a:solidFill>
+              </a:rPr>
+              <a:t>която принтира всички симетрични числа в интервала </a:t>
+            </a:r>
+            <a:r>
+              <a:rPr lang="ru-RU" sz="2400" dirty="0" smtClean="0">
+                <a:solidFill>
+                  <a:schemeClr val="bg1">
+                    <a:lumMod val="95000"/>
+                  </a:schemeClr>
+                </a:solidFill>
+              </a:rPr>
+              <a:t>[</a:t>
+            </a:r>
+            <a:r>
+              <a:rPr lang="en-US" sz="2400" dirty="0" smtClean="0">
+                <a:solidFill>
+                  <a:schemeClr val="bg1">
+                    <a:lumMod val="95000"/>
+                  </a:schemeClr>
+                </a:solidFill>
+              </a:rPr>
+              <a:t>10</a:t>
+            </a:r>
+            <a:r>
+              <a:rPr lang="ru-RU" sz="2400" dirty="0" smtClean="0">
+                <a:solidFill>
+                  <a:schemeClr val="bg1">
+                    <a:lumMod val="95000"/>
+                  </a:schemeClr>
+                </a:solidFill>
+              </a:rPr>
+              <a:t> </a:t>
+            </a:r>
+            <a:r>
+              <a:rPr lang="ru-RU" sz="2400" dirty="0">
+                <a:solidFill>
+                  <a:schemeClr val="bg1">
+                    <a:lumMod val="95000"/>
+                  </a:schemeClr>
+                </a:solidFill>
+              </a:rPr>
+              <a:t>; 999]</a:t>
+            </a:r>
+          </a:p>
+          <a:p>
+            <a:pPr marL="400050" lvl="1" indent="0">
+              <a:buNone/>
+            </a:pPr>
+            <a:r>
+              <a:rPr lang="ru-RU" sz="2000" dirty="0" smtClean="0">
+                <a:solidFill>
+                  <a:schemeClr val="accent6"/>
+                </a:solidFill>
+              </a:rPr>
+              <a:t>Симетрично </a:t>
+            </a:r>
+            <a:r>
+              <a:rPr lang="ru-RU" sz="2000" dirty="0">
+                <a:solidFill>
+                  <a:schemeClr val="accent6"/>
+                </a:solidFill>
+              </a:rPr>
+              <a:t>число е </a:t>
+            </a:r>
+            <a:r>
+              <a:rPr lang="ru-RU" sz="2000" dirty="0" smtClean="0">
+                <a:solidFill>
+                  <a:schemeClr val="accent6"/>
+                </a:solidFill>
+              </a:rPr>
+              <a:t>число, </a:t>
+            </a:r>
+            <a:r>
+              <a:rPr lang="ru-RU" sz="2000" dirty="0">
+                <a:solidFill>
+                  <a:schemeClr val="accent6"/>
+                </a:solidFill>
+              </a:rPr>
+              <a:t>на което цифрите са симетрични спрямо средата Например: </a:t>
+            </a:r>
+            <a:r>
+              <a:rPr lang="en-US" sz="2000" dirty="0" smtClean="0">
+                <a:solidFill>
+                  <a:schemeClr val="accent6"/>
+                </a:solidFill>
+              </a:rPr>
+              <a:t>11, 22, </a:t>
+            </a:r>
+            <a:r>
+              <a:rPr lang="ru-RU" sz="2000" dirty="0" smtClean="0">
+                <a:solidFill>
+                  <a:schemeClr val="accent6"/>
+                </a:solidFill>
+              </a:rPr>
+              <a:t>101</a:t>
+            </a:r>
+            <a:r>
+              <a:rPr lang="ru-RU" sz="2000" dirty="0">
+                <a:solidFill>
+                  <a:schemeClr val="accent6"/>
+                </a:solidFill>
+              </a:rPr>
+              <a:t>, </a:t>
+            </a:r>
+            <a:r>
+              <a:rPr lang="ru-RU" sz="2000" dirty="0" smtClean="0">
+                <a:solidFill>
+                  <a:schemeClr val="accent6"/>
+                </a:solidFill>
+              </a:rPr>
+              <a:t>303,</a:t>
+            </a:r>
+          </a:p>
+          <a:p>
+            <a:pPr marL="400050" lvl="1" indent="0">
+              <a:buNone/>
+            </a:pPr>
+            <a:endParaRPr lang="ru-RU" sz="2000" dirty="0">
+              <a:solidFill>
+                <a:schemeClr val="bg1">
+                  <a:lumMod val="95000"/>
+                </a:schemeClr>
+              </a:solidFill>
+            </a:endParaRPr>
+          </a:p>
+        </p:txBody>
+      </p:sp>
+    </p:spTree>
+    <p:extLst>
+      <p:ext uri="{BB962C8B-B14F-4D97-AF65-F5344CB8AC3E}">
+        <p14:creationId xmlns:p14="http://schemas.microsoft.com/office/powerpoint/2010/main" val="1457439091"/>
+      </p:ext>
+    </p:extLst>
+  </p:cSld>
+  <p:clrMapOvr>
+    <a:masterClrMapping/>
+  </p:clrMapOvr>
+  <p:timing>
+    <p:tnLst>
+      <p:par>
+        <p:cTn id="1" dur="indefinite" restart="never" nodeType="tmRoot"/>
+      </p:par>
+    </p:tnLst>
+  </p:timing>
+</p:sld>
+</file>
+
+<file path=ppt/slides/slide33.xml><?xml version="1.0" encoding="utf-8"?>
+<p:sld xmlns:a="http://schemas.openxmlformats.org/drawingml/2006/main" xmlns:r="http://schemas.openxmlformats.org/officeDocument/2006/relationships" xmlns:p="http://schemas.openxmlformats.org/presentationml/2006/main">
+  <p:cSld>
+    <p:spTree>
+      <p:nvGrpSpPr>
+        <p:cNvPr id="1" name=""/>
+        <p:cNvGrpSpPr/>
+        <p:nvPr/>
+      </p:nvGrpSpPr>
+      <p:grpSpPr>
+        <a:xfrm>
+          <a:off x="0" y="0"/>
+          <a:ext cx="0" cy="0"/>
+          <a:chOff x="0" y="0"/>
+          <a:chExt cx="0" cy="0"/>
+        </a:xfrm>
+      </p:grpSpPr>
+      <p:sp>
+        <p:nvSpPr>
+          <p:cNvPr id="2" name="Title 1"/>
+          <p:cNvSpPr>
+            <a:spLocks noGrp="1"/>
+          </p:cNvSpPr>
+          <p:nvPr>
+            <p:ph type="title"/>
+          </p:nvPr>
+        </p:nvSpPr>
+        <p:spPr>
+          <a:xfrm>
+            <a:off x="838200" y="685800"/>
+            <a:ext cx="8229600" cy="1143000"/>
+          </a:xfrm>
+        </p:spPr>
+        <p:txBody>
+          <a:bodyPr/>
+          <a:lstStyle/>
+          <a:p>
+            <a:pPr algn="l"/>
+            <a:r>
+              <a:rPr lang="bg-BG" dirty="0">
+                <a:solidFill>
+                  <a:schemeClr val="accent6"/>
+                </a:solidFill>
+              </a:rPr>
+              <a:t>Задачи за домашна работа</a:t>
             </a:r>
             <a:endParaRPr lang="bg-BG" dirty="0">
               <a:solidFill>

</xml_diff>

<commit_message>
Added Lecture 10 and examples
</commit_message>
<xml_diff>
--- a/08-Methods-and-Recursion.pptx
+++ b/08-Methods-and-Recursion.pptx
@@ -240,7 +240,7 @@
           <a:p>
             <a:fld id="{1A052DDE-B79B-4585-97B6-DCDE6083B029}" type="datetimeFigureOut">
               <a:rPr lang="bg-BG" smtClean="0"/>
-              <a:t>22.5.2015 г.</a:t>
+              <a:t>27.5.2015 г.</a:t>
             </a:fld>
             <a:endParaRPr lang="bg-BG"/>
           </a:p>
@@ -773,7 +773,7 @@
           <a:p>
             <a:fld id="{3EA744D9-3FBE-48D8-BF2A-85DF203E4D20}" type="datetimeFigureOut">
               <a:rPr lang="bg-BG" smtClean="0"/>
-              <a:t>22.5.2015 г.</a:t>
+              <a:t>27.5.2015 г.</a:t>
             </a:fld>
             <a:endParaRPr lang="bg-BG"/>
           </a:p>
@@ -943,7 +943,7 @@
           <a:p>
             <a:fld id="{3EA744D9-3FBE-48D8-BF2A-85DF203E4D20}" type="datetimeFigureOut">
               <a:rPr lang="bg-BG" smtClean="0"/>
-              <a:t>22.5.2015 г.</a:t>
+              <a:t>27.5.2015 г.</a:t>
             </a:fld>
             <a:endParaRPr lang="bg-BG"/>
           </a:p>
@@ -1123,7 +1123,7 @@
           <a:p>
             <a:fld id="{3EA744D9-3FBE-48D8-BF2A-85DF203E4D20}" type="datetimeFigureOut">
               <a:rPr lang="bg-BG" smtClean="0"/>
-              <a:t>22.5.2015 г.</a:t>
+              <a:t>27.5.2015 г.</a:t>
             </a:fld>
             <a:endParaRPr lang="bg-BG"/>
           </a:p>
@@ -1293,7 +1293,7 @@
           <a:p>
             <a:fld id="{3EA744D9-3FBE-48D8-BF2A-85DF203E4D20}" type="datetimeFigureOut">
               <a:rPr lang="bg-BG" smtClean="0"/>
-              <a:t>22.5.2015 г.</a:t>
+              <a:t>27.5.2015 г.</a:t>
             </a:fld>
             <a:endParaRPr lang="bg-BG"/>
           </a:p>
@@ -1539,7 +1539,7 @@
           <a:p>
             <a:fld id="{3EA744D9-3FBE-48D8-BF2A-85DF203E4D20}" type="datetimeFigureOut">
               <a:rPr lang="bg-BG" smtClean="0"/>
-              <a:t>22.5.2015 г.</a:t>
+              <a:t>27.5.2015 г.</a:t>
             </a:fld>
             <a:endParaRPr lang="bg-BG"/>
           </a:p>
@@ -1827,7 +1827,7 @@
           <a:p>
             <a:fld id="{3EA744D9-3FBE-48D8-BF2A-85DF203E4D20}" type="datetimeFigureOut">
               <a:rPr lang="bg-BG" smtClean="0"/>
-              <a:t>22.5.2015 г.</a:t>
+              <a:t>27.5.2015 г.</a:t>
             </a:fld>
             <a:endParaRPr lang="bg-BG"/>
           </a:p>
@@ -2249,7 +2249,7 @@
           <a:p>
             <a:fld id="{3EA744D9-3FBE-48D8-BF2A-85DF203E4D20}" type="datetimeFigureOut">
               <a:rPr lang="bg-BG" smtClean="0"/>
-              <a:t>22.5.2015 г.</a:t>
+              <a:t>27.5.2015 г.</a:t>
             </a:fld>
             <a:endParaRPr lang="bg-BG"/>
           </a:p>
@@ -2367,7 +2367,7 @@
           <a:p>
             <a:fld id="{3EA744D9-3FBE-48D8-BF2A-85DF203E4D20}" type="datetimeFigureOut">
               <a:rPr lang="bg-BG" smtClean="0"/>
-              <a:t>22.5.2015 г.</a:t>
+              <a:t>27.5.2015 г.</a:t>
             </a:fld>
             <a:endParaRPr lang="bg-BG"/>
           </a:p>
@@ -2462,7 +2462,7 @@
           <a:p>
             <a:fld id="{3EA744D9-3FBE-48D8-BF2A-85DF203E4D20}" type="datetimeFigureOut">
               <a:rPr lang="bg-BG" smtClean="0"/>
-              <a:t>22.5.2015 г.</a:t>
+              <a:t>27.5.2015 г.</a:t>
             </a:fld>
             <a:endParaRPr lang="bg-BG"/>
           </a:p>
@@ -2739,7 +2739,7 @@
           <a:p>
             <a:fld id="{3EA744D9-3FBE-48D8-BF2A-85DF203E4D20}" type="datetimeFigureOut">
               <a:rPr lang="bg-BG" smtClean="0"/>
-              <a:t>22.5.2015 г.</a:t>
+              <a:t>27.5.2015 г.</a:t>
             </a:fld>
             <a:endParaRPr lang="bg-BG"/>
           </a:p>
@@ -2992,7 +2992,7 @@
           <a:p>
             <a:fld id="{3EA744D9-3FBE-48D8-BF2A-85DF203E4D20}" type="datetimeFigureOut">
               <a:rPr lang="bg-BG" smtClean="0"/>
-              <a:t>22.5.2015 г.</a:t>
+              <a:t>27.5.2015 г.</a:t>
             </a:fld>
             <a:endParaRPr lang="bg-BG"/>
           </a:p>
@@ -3214,7 +3214,7 @@
           <a:p>
             <a:fld id="{3EA744D9-3FBE-48D8-BF2A-85DF203E4D20}" type="datetimeFigureOut">
               <a:rPr lang="bg-BG" smtClean="0"/>
-              <a:t>22.5.2015 г.</a:t>
+              <a:t>27.5.2015 г.</a:t>
             </a:fld>
             <a:endParaRPr lang="bg-BG"/>
           </a:p>
@@ -5847,17 +5847,7 @@
                   </a:schemeClr>
                 </a:solidFill>
               </a:rPr>
-              <a:t>Когато </a:t>
-            </a:r>
-            <a:r>
-              <a:rPr lang="ru-RU" dirty="0" smtClean="0">
-                <a:solidFill>
-                  <a:schemeClr val="bg1">
-                    <a:lumMod val="95000"/>
-                  </a:schemeClr>
-                </a:solidFill>
-              </a:rPr>
-              <a:t>се налага да използваме много големи числа</a:t>
+              <a:t>Когато се налага да използваме много големи числа</a:t>
             </a:r>
             <a:r>
               <a:rPr lang="en-US" dirty="0" smtClean="0">
@@ -7343,11 +7333,6 @@
               </a:rPr>
               <a:t>а</a:t>
             </a:r>
-            <a:endParaRPr lang="bg-BG" dirty="0">
-              <a:solidFill>
-                <a:schemeClr val="accent6"/>
-              </a:solidFill>
-            </a:endParaRPr>
           </a:p>
         </p:txBody>
       </p:sp>
@@ -7924,11 +7909,6 @@
               </a:rPr>
               <a:t>Задачи за домашна работа</a:t>
             </a:r>
-            <a:endParaRPr lang="bg-BG" dirty="0">
-              <a:solidFill>
-                <a:schemeClr val="accent6"/>
-              </a:solidFill>
-            </a:endParaRPr>
           </a:p>
         </p:txBody>
       </p:sp>
@@ -8266,7 +8246,7 @@
                   </a:schemeClr>
                 </a:solidFill>
               </a:rPr>
-              <a:t>четно«, </a:t>
+              <a:t>четно", </a:t>
             </a:r>
             <a:r>
               <a:rPr lang="ru-RU" sz="2400" dirty="0">
@@ -8306,27 +8286,7 @@
                   </a:schemeClr>
                 </a:solidFill>
               </a:rPr>
-              <a:t>нечетно</a:t>
-            </a:r>
-            <a:r>
-              <a:rPr lang="ru-RU" sz="2400" dirty="0">
-                <a:solidFill>
-                  <a:schemeClr val="bg1">
-                    <a:lumMod val="95000"/>
-                  </a:schemeClr>
-                </a:solidFill>
-              </a:rPr>
-              <a:t> "</a:t>
-            </a:r>
-            <a:r>
-              <a:rPr lang="ru-RU" sz="2400" dirty="0" smtClean="0">
-                <a:solidFill>
-                  <a:schemeClr val="bg1">
-                    <a:lumMod val="95000"/>
-                  </a:schemeClr>
-                </a:solidFill>
-              </a:rPr>
-              <a:t>, </a:t>
+              <a:t>нечетно", </a:t>
             </a:r>
             <a:r>
               <a:rPr lang="ru-RU" sz="2400" dirty="0">
@@ -8564,11 +8524,6 @@
               </a:rPr>
               <a:t>Задачи за домашна работа</a:t>
             </a:r>
-            <a:endParaRPr lang="bg-BG" dirty="0">
-              <a:solidFill>
-                <a:schemeClr val="accent6"/>
-              </a:solidFill>
-            </a:endParaRPr>
           </a:p>
         </p:txBody>
       </p:sp>

</xml_diff>